<commit_message>
Plotly and Dash for dashboard output with interval based updates
</commit_message>
<xml_diff>
--- a/Trade Bot.pptx
+++ b/Trade Bot.pptx
@@ -20,6 +20,7 @@
     <p:sldId id="267" r:id="rId14"/>
     <p:sldId id="268" r:id="rId15"/>
     <p:sldId id="271" r:id="rId16"/>
+    <p:sldId id="272" r:id="rId17"/>
   </p:sldIdLst>
   <p:sldSz cx="12192000" cy="6858000"/>
   <p:notesSz cx="6858000" cy="9144000"/>
@@ -275,7 +276,7 @@
           <a:p>
             <a:fld id="{7DF43821-60AB-408D-8E7E-E9FE9B9750F4}" type="datetimeFigureOut">
               <a:rPr lang="en-SG" smtClean="0"/>
-              <a:t>17/01/2022</a:t>
+              <a:t>03/02/2022</a:t>
             </a:fld>
             <a:endParaRPr lang="en-SG"/>
           </a:p>
@@ -475,7 +476,7 @@
           <a:p>
             <a:fld id="{7DF43821-60AB-408D-8E7E-E9FE9B9750F4}" type="datetimeFigureOut">
               <a:rPr lang="en-SG" smtClean="0"/>
-              <a:t>17/01/2022</a:t>
+              <a:t>03/02/2022</a:t>
             </a:fld>
             <a:endParaRPr lang="en-SG"/>
           </a:p>
@@ -685,7 +686,7 @@
           <a:p>
             <a:fld id="{7DF43821-60AB-408D-8E7E-E9FE9B9750F4}" type="datetimeFigureOut">
               <a:rPr lang="en-SG" smtClean="0"/>
-              <a:t>17/01/2022</a:t>
+              <a:t>03/02/2022</a:t>
             </a:fld>
             <a:endParaRPr lang="en-SG"/>
           </a:p>
@@ -885,7 +886,7 @@
           <a:p>
             <a:fld id="{7DF43821-60AB-408D-8E7E-E9FE9B9750F4}" type="datetimeFigureOut">
               <a:rPr lang="en-SG" smtClean="0"/>
-              <a:t>17/01/2022</a:t>
+              <a:t>03/02/2022</a:t>
             </a:fld>
             <a:endParaRPr lang="en-SG"/>
           </a:p>
@@ -1161,7 +1162,7 @@
           <a:p>
             <a:fld id="{7DF43821-60AB-408D-8E7E-E9FE9B9750F4}" type="datetimeFigureOut">
               <a:rPr lang="en-SG" smtClean="0"/>
-              <a:t>17/01/2022</a:t>
+              <a:t>03/02/2022</a:t>
             </a:fld>
             <a:endParaRPr lang="en-SG"/>
           </a:p>
@@ -1429,7 +1430,7 @@
           <a:p>
             <a:fld id="{7DF43821-60AB-408D-8E7E-E9FE9B9750F4}" type="datetimeFigureOut">
               <a:rPr lang="en-SG" smtClean="0"/>
-              <a:t>17/01/2022</a:t>
+              <a:t>03/02/2022</a:t>
             </a:fld>
             <a:endParaRPr lang="en-SG"/>
           </a:p>
@@ -1844,7 +1845,7 @@
           <a:p>
             <a:fld id="{7DF43821-60AB-408D-8E7E-E9FE9B9750F4}" type="datetimeFigureOut">
               <a:rPr lang="en-SG" smtClean="0"/>
-              <a:t>17/01/2022</a:t>
+              <a:t>03/02/2022</a:t>
             </a:fld>
             <a:endParaRPr lang="en-SG"/>
           </a:p>
@@ -1986,7 +1987,7 @@
           <a:p>
             <a:fld id="{7DF43821-60AB-408D-8E7E-E9FE9B9750F4}" type="datetimeFigureOut">
               <a:rPr lang="en-SG" smtClean="0"/>
-              <a:t>17/01/2022</a:t>
+              <a:t>03/02/2022</a:t>
             </a:fld>
             <a:endParaRPr lang="en-SG"/>
           </a:p>
@@ -2099,7 +2100,7 @@
           <a:p>
             <a:fld id="{7DF43821-60AB-408D-8E7E-E9FE9B9750F4}" type="datetimeFigureOut">
               <a:rPr lang="en-SG" smtClean="0"/>
-              <a:t>17/01/2022</a:t>
+              <a:t>03/02/2022</a:t>
             </a:fld>
             <a:endParaRPr lang="en-SG"/>
           </a:p>
@@ -2412,7 +2413,7 @@
           <a:p>
             <a:fld id="{7DF43821-60AB-408D-8E7E-E9FE9B9750F4}" type="datetimeFigureOut">
               <a:rPr lang="en-SG" smtClean="0"/>
-              <a:t>17/01/2022</a:t>
+              <a:t>03/02/2022</a:t>
             </a:fld>
             <a:endParaRPr lang="en-SG"/>
           </a:p>
@@ -2701,7 +2702,7 @@
           <a:p>
             <a:fld id="{7DF43821-60AB-408D-8E7E-E9FE9B9750F4}" type="datetimeFigureOut">
               <a:rPr lang="en-SG" smtClean="0"/>
-              <a:t>17/01/2022</a:t>
+              <a:t>03/02/2022</a:t>
             </a:fld>
             <a:endParaRPr lang="en-SG"/>
           </a:p>
@@ -2944,7 +2945,7 @@
           <a:p>
             <a:fld id="{7DF43821-60AB-408D-8E7E-E9FE9B9750F4}" type="datetimeFigureOut">
               <a:rPr lang="en-SG" smtClean="0"/>
-              <a:t>17/01/2022</a:t>
+              <a:t>03/02/2022</a:t>
             </a:fld>
             <a:endParaRPr lang="en-SG"/>
           </a:p>
@@ -7502,6 +7503,1826 @@
 </p:sld>
 </file>
 
+<file path=ppt/slides/slide16.xml><?xml version="1.0" encoding="utf-8"?>
+<p:sld xmlns:a="http://schemas.openxmlformats.org/drawingml/2006/main" xmlns:r="http://schemas.openxmlformats.org/officeDocument/2006/relationships" xmlns:p="http://schemas.openxmlformats.org/presentationml/2006/main">
+  <p:cSld>
+    <p:spTree>
+      <p:nvGrpSpPr>
+        <p:cNvPr id="1" name=""/>
+        <p:cNvGrpSpPr/>
+        <p:nvPr/>
+      </p:nvGrpSpPr>
+      <p:grpSpPr>
+        <a:xfrm>
+          <a:off x="0" y="0"/>
+          <a:ext cx="0" cy="0"/>
+          <a:chOff x="0" y="0"/>
+          <a:chExt cx="0" cy="0"/>
+        </a:xfrm>
+      </p:grpSpPr>
+      <p:sp>
+        <p:nvSpPr>
+          <p:cNvPr id="2" name="Title 1">
+            <a:extLst>
+              <a:ext uri="{FF2B5EF4-FFF2-40B4-BE49-F238E27FC236}">
+                <a16:creationId xmlns:a16="http://schemas.microsoft.com/office/drawing/2014/main" id="{C799DFD5-9CBF-49C3-A637-3376FEBA9836}"/>
+              </a:ext>
+            </a:extLst>
+          </p:cNvPr>
+          <p:cNvSpPr>
+            <a:spLocks noGrp="1"/>
+          </p:cNvSpPr>
+          <p:nvPr>
+            <p:ph type="ctrTitle"/>
+          </p:nvPr>
+        </p:nvSpPr>
+        <p:spPr>
+          <a:xfrm>
+            <a:off x="1524000" y="58547"/>
+            <a:ext cx="9144000" cy="974725"/>
+          </a:xfrm>
+        </p:spPr>
+        <p:txBody>
+          <a:bodyPr/>
+          <a:lstStyle/>
+          <a:p>
+            <a:r>
+              <a:rPr lang="en-US" dirty="0"/>
+              <a:t>Processing Flow Chart</a:t>
+            </a:r>
+            <a:endParaRPr lang="en-SG" dirty="0"/>
+          </a:p>
+        </p:txBody>
+      </p:sp>
+      <p:sp>
+        <p:nvSpPr>
+          <p:cNvPr id="4" name="Rectangle 3">
+            <a:extLst>
+              <a:ext uri="{FF2B5EF4-FFF2-40B4-BE49-F238E27FC236}">
+                <a16:creationId xmlns:a16="http://schemas.microsoft.com/office/drawing/2014/main" id="{08289B44-1F75-4620-BB5E-05E4EE23FF00}"/>
+              </a:ext>
+            </a:extLst>
+          </p:cNvPr>
+          <p:cNvSpPr/>
+          <p:nvPr/>
+        </p:nvSpPr>
+        <p:spPr>
+          <a:xfrm>
+            <a:off x="2112264" y="2388526"/>
+            <a:ext cx="1783080" cy="658367"/>
+          </a:xfrm>
+          <a:prstGeom prst="rect">
+            <a:avLst/>
+          </a:prstGeom>
+        </p:spPr>
+        <p:style>
+          <a:lnRef idx="2">
+            <a:schemeClr val="dk1"/>
+          </a:lnRef>
+          <a:fillRef idx="1">
+            <a:schemeClr val="lt1"/>
+          </a:fillRef>
+          <a:effectRef idx="0">
+            <a:schemeClr val="dk1"/>
+          </a:effectRef>
+          <a:fontRef idx="minor">
+            <a:schemeClr val="dk1"/>
+          </a:fontRef>
+        </p:style>
+        <p:txBody>
+          <a:bodyPr rtlCol="0" anchor="ctr"/>
+          <a:lstStyle/>
+          <a:p>
+            <a:pPr algn="ctr"/>
+            <a:r>
+              <a:rPr lang="en-SG" sz="1200" dirty="0"/>
+              <a:t>Retrieve tickers from watchlist.csv (exported from trading view)</a:t>
+            </a:r>
+          </a:p>
+        </p:txBody>
+      </p:sp>
+      <p:sp>
+        <p:nvSpPr>
+          <p:cNvPr id="6" name="Rectangle 5">
+            <a:extLst>
+              <a:ext uri="{FF2B5EF4-FFF2-40B4-BE49-F238E27FC236}">
+                <a16:creationId xmlns:a16="http://schemas.microsoft.com/office/drawing/2014/main" id="{082486E2-5551-494D-B786-DA543CFB1431}"/>
+              </a:ext>
+            </a:extLst>
+          </p:cNvPr>
+          <p:cNvSpPr/>
+          <p:nvPr/>
+        </p:nvSpPr>
+        <p:spPr>
+          <a:xfrm>
+            <a:off x="2112264" y="3659542"/>
+            <a:ext cx="1783080" cy="658367"/>
+          </a:xfrm>
+          <a:prstGeom prst="rect">
+            <a:avLst/>
+          </a:prstGeom>
+        </p:spPr>
+        <p:style>
+          <a:lnRef idx="2">
+            <a:schemeClr val="dk1"/>
+          </a:lnRef>
+          <a:fillRef idx="1">
+            <a:schemeClr val="lt1"/>
+          </a:fillRef>
+          <a:effectRef idx="0">
+            <a:schemeClr val="dk1"/>
+          </a:effectRef>
+          <a:fontRef idx="minor">
+            <a:schemeClr val="dk1"/>
+          </a:fontRef>
+        </p:style>
+        <p:txBody>
+          <a:bodyPr rtlCol="0" anchor="ctr"/>
+          <a:lstStyle/>
+          <a:p>
+            <a:pPr algn="ctr"/>
+            <a:r>
+              <a:rPr lang="en-SG" sz="1200" dirty="0"/>
+              <a:t>Create a dictionary of tickers + </a:t>
+            </a:r>
+            <a:r>
+              <a:rPr lang="en-SG" sz="1200" dirty="0" err="1"/>
+              <a:t>dataframes</a:t>
+            </a:r>
+            <a:endParaRPr lang="en-SG" sz="1200" dirty="0"/>
+          </a:p>
+        </p:txBody>
+      </p:sp>
+      <p:cxnSp>
+        <p:nvCxnSpPr>
+          <p:cNvPr id="8" name="Straight Arrow Connector 7">
+            <a:extLst>
+              <a:ext uri="{FF2B5EF4-FFF2-40B4-BE49-F238E27FC236}">
+                <a16:creationId xmlns:a16="http://schemas.microsoft.com/office/drawing/2014/main" id="{4BF7A10F-9FF2-4DFE-9EFB-6F46F28CB261}"/>
+              </a:ext>
+            </a:extLst>
+          </p:cNvPr>
+          <p:cNvCxnSpPr>
+            <a:stCxn id="4" idx="2"/>
+            <a:endCxn id="6" idx="0"/>
+          </p:cNvCxnSpPr>
+          <p:nvPr/>
+        </p:nvCxnSpPr>
+        <p:spPr>
+          <a:xfrm>
+            <a:off x="3003804" y="3046893"/>
+            <a:ext cx="0" cy="612649"/>
+          </a:xfrm>
+          <a:prstGeom prst="straightConnector1">
+            <a:avLst/>
+          </a:prstGeom>
+          <a:ln>
+            <a:tailEnd type="triangle"/>
+          </a:ln>
+        </p:spPr>
+        <p:style>
+          <a:lnRef idx="1">
+            <a:schemeClr val="accent1"/>
+          </a:lnRef>
+          <a:fillRef idx="0">
+            <a:schemeClr val="accent1"/>
+          </a:fillRef>
+          <a:effectRef idx="0">
+            <a:schemeClr val="accent1"/>
+          </a:effectRef>
+          <a:fontRef idx="minor">
+            <a:schemeClr val="tx1"/>
+          </a:fontRef>
+        </p:style>
+      </p:cxnSp>
+      <p:sp>
+        <p:nvSpPr>
+          <p:cNvPr id="9" name="Subtitle 2">
+            <a:extLst>
+              <a:ext uri="{FF2B5EF4-FFF2-40B4-BE49-F238E27FC236}">
+                <a16:creationId xmlns:a16="http://schemas.microsoft.com/office/drawing/2014/main" id="{E144F5D3-831B-4EB6-9C20-55EBBE13C0F6}"/>
+              </a:ext>
+            </a:extLst>
+          </p:cNvPr>
+          <p:cNvSpPr txBox="1">
+            <a:spLocks/>
+          </p:cNvSpPr>
+          <p:nvPr/>
+        </p:nvSpPr>
+        <p:spPr>
+          <a:xfrm>
+            <a:off x="2036760" y="1122062"/>
+            <a:ext cx="2018754" cy="392558"/>
+          </a:xfrm>
+          <a:prstGeom prst="rect">
+            <a:avLst/>
+          </a:prstGeom>
+        </p:spPr>
+        <p:txBody>
+          <a:bodyPr vert="horz" lIns="91440" tIns="45720" rIns="91440" bIns="45720" rtlCol="0">
+            <a:noAutofit/>
+          </a:bodyPr>
+          <a:lstStyle>
+            <a:lvl1pPr marL="0" indent="0" algn="ctr" defTabSz="914400" rtl="0" eaLnBrk="1" latinLnBrk="0" hangingPunct="1">
+              <a:lnSpc>
+                <a:spcPct val="90000"/>
+              </a:lnSpc>
+              <a:spcBef>
+                <a:spcPts val="1000"/>
+              </a:spcBef>
+              <a:buFont typeface="Arial" panose="020B0604020202020204" pitchFamily="34" charset="0"/>
+              <a:buNone/>
+              <a:defRPr sz="2400" kern="1200">
+                <a:solidFill>
+                  <a:schemeClr val="tx1"/>
+                </a:solidFill>
+                <a:latin typeface="+mn-lt"/>
+                <a:ea typeface="+mn-ea"/>
+                <a:cs typeface="+mn-cs"/>
+              </a:defRPr>
+            </a:lvl1pPr>
+            <a:lvl2pPr marL="457200" indent="0" algn="ctr" defTabSz="914400" rtl="0" eaLnBrk="1" latinLnBrk="0" hangingPunct="1">
+              <a:lnSpc>
+                <a:spcPct val="90000"/>
+              </a:lnSpc>
+              <a:spcBef>
+                <a:spcPts val="500"/>
+              </a:spcBef>
+              <a:buFont typeface="Arial" panose="020B0604020202020204" pitchFamily="34" charset="0"/>
+              <a:buNone/>
+              <a:defRPr sz="2000" kern="1200">
+                <a:solidFill>
+                  <a:schemeClr val="tx1"/>
+                </a:solidFill>
+                <a:latin typeface="+mn-lt"/>
+                <a:ea typeface="+mn-ea"/>
+                <a:cs typeface="+mn-cs"/>
+              </a:defRPr>
+            </a:lvl2pPr>
+            <a:lvl3pPr marL="914400" indent="0" algn="ctr" defTabSz="914400" rtl="0" eaLnBrk="1" latinLnBrk="0" hangingPunct="1">
+              <a:lnSpc>
+                <a:spcPct val="90000"/>
+              </a:lnSpc>
+              <a:spcBef>
+                <a:spcPts val="500"/>
+              </a:spcBef>
+              <a:buFont typeface="Arial" panose="020B0604020202020204" pitchFamily="34" charset="0"/>
+              <a:buNone/>
+              <a:defRPr sz="1800" kern="1200">
+                <a:solidFill>
+                  <a:schemeClr val="tx1"/>
+                </a:solidFill>
+                <a:latin typeface="+mn-lt"/>
+                <a:ea typeface="+mn-ea"/>
+                <a:cs typeface="+mn-cs"/>
+              </a:defRPr>
+            </a:lvl3pPr>
+            <a:lvl4pPr marL="1371600" indent="0" algn="ctr" defTabSz="914400" rtl="0" eaLnBrk="1" latinLnBrk="0" hangingPunct="1">
+              <a:lnSpc>
+                <a:spcPct val="90000"/>
+              </a:lnSpc>
+              <a:spcBef>
+                <a:spcPts val="500"/>
+              </a:spcBef>
+              <a:buFont typeface="Arial" panose="020B0604020202020204" pitchFamily="34" charset="0"/>
+              <a:buNone/>
+              <a:defRPr sz="1600" kern="1200">
+                <a:solidFill>
+                  <a:schemeClr val="tx1"/>
+                </a:solidFill>
+                <a:latin typeface="+mn-lt"/>
+                <a:ea typeface="+mn-ea"/>
+                <a:cs typeface="+mn-cs"/>
+              </a:defRPr>
+            </a:lvl4pPr>
+            <a:lvl5pPr marL="1828800" indent="0" algn="ctr" defTabSz="914400" rtl="0" eaLnBrk="1" latinLnBrk="0" hangingPunct="1">
+              <a:lnSpc>
+                <a:spcPct val="90000"/>
+              </a:lnSpc>
+              <a:spcBef>
+                <a:spcPts val="500"/>
+              </a:spcBef>
+              <a:buFont typeface="Arial" panose="020B0604020202020204" pitchFamily="34" charset="0"/>
+              <a:buNone/>
+              <a:defRPr sz="1600" kern="1200">
+                <a:solidFill>
+                  <a:schemeClr val="tx1"/>
+                </a:solidFill>
+                <a:latin typeface="+mn-lt"/>
+                <a:ea typeface="+mn-ea"/>
+                <a:cs typeface="+mn-cs"/>
+              </a:defRPr>
+            </a:lvl5pPr>
+            <a:lvl6pPr marL="2286000" indent="0" algn="ctr" defTabSz="914400" rtl="0" eaLnBrk="1" latinLnBrk="0" hangingPunct="1">
+              <a:lnSpc>
+                <a:spcPct val="90000"/>
+              </a:lnSpc>
+              <a:spcBef>
+                <a:spcPts val="500"/>
+              </a:spcBef>
+              <a:buFont typeface="Arial" panose="020B0604020202020204" pitchFamily="34" charset="0"/>
+              <a:buNone/>
+              <a:defRPr sz="1600" kern="1200">
+                <a:solidFill>
+                  <a:schemeClr val="tx1"/>
+                </a:solidFill>
+                <a:latin typeface="+mn-lt"/>
+                <a:ea typeface="+mn-ea"/>
+                <a:cs typeface="+mn-cs"/>
+              </a:defRPr>
+            </a:lvl6pPr>
+            <a:lvl7pPr marL="2743200" indent="0" algn="ctr" defTabSz="914400" rtl="0" eaLnBrk="1" latinLnBrk="0" hangingPunct="1">
+              <a:lnSpc>
+                <a:spcPct val="90000"/>
+              </a:lnSpc>
+              <a:spcBef>
+                <a:spcPts val="500"/>
+              </a:spcBef>
+              <a:buFont typeface="Arial" panose="020B0604020202020204" pitchFamily="34" charset="0"/>
+              <a:buNone/>
+              <a:defRPr sz="1600" kern="1200">
+                <a:solidFill>
+                  <a:schemeClr val="tx1"/>
+                </a:solidFill>
+                <a:latin typeface="+mn-lt"/>
+                <a:ea typeface="+mn-ea"/>
+                <a:cs typeface="+mn-cs"/>
+              </a:defRPr>
+            </a:lvl7pPr>
+            <a:lvl8pPr marL="3200400" indent="0" algn="ctr" defTabSz="914400" rtl="0" eaLnBrk="1" latinLnBrk="0" hangingPunct="1">
+              <a:lnSpc>
+                <a:spcPct val="90000"/>
+              </a:lnSpc>
+              <a:spcBef>
+                <a:spcPts val="500"/>
+              </a:spcBef>
+              <a:buFont typeface="Arial" panose="020B0604020202020204" pitchFamily="34" charset="0"/>
+              <a:buNone/>
+              <a:defRPr sz="1600" kern="1200">
+                <a:solidFill>
+                  <a:schemeClr val="tx1"/>
+                </a:solidFill>
+                <a:latin typeface="+mn-lt"/>
+                <a:ea typeface="+mn-ea"/>
+                <a:cs typeface="+mn-cs"/>
+              </a:defRPr>
+            </a:lvl8pPr>
+            <a:lvl9pPr marL="3657600" indent="0" algn="ctr" defTabSz="914400" rtl="0" eaLnBrk="1" latinLnBrk="0" hangingPunct="1">
+              <a:lnSpc>
+                <a:spcPct val="90000"/>
+              </a:lnSpc>
+              <a:spcBef>
+                <a:spcPts val="500"/>
+              </a:spcBef>
+              <a:buFont typeface="Arial" panose="020B0604020202020204" pitchFamily="34" charset="0"/>
+              <a:buNone/>
+              <a:defRPr sz="1600" kern="1200">
+                <a:solidFill>
+                  <a:schemeClr val="tx1"/>
+                </a:solidFill>
+                <a:latin typeface="+mn-lt"/>
+                <a:ea typeface="+mn-ea"/>
+                <a:cs typeface="+mn-cs"/>
+              </a:defRPr>
+            </a:lvl9pPr>
+          </a:lstStyle>
+          <a:p>
+            <a:pPr algn="l"/>
+            <a:r>
+              <a:rPr lang="en-US" sz="1200" b="1" dirty="0"/>
+              <a:t>Start of program (run once)</a:t>
+            </a:r>
+            <a:endParaRPr lang="en-US" sz="1200" dirty="0"/>
+          </a:p>
+        </p:txBody>
+      </p:sp>
+      <p:sp>
+        <p:nvSpPr>
+          <p:cNvPr id="10" name="Subtitle 2">
+            <a:extLst>
+              <a:ext uri="{FF2B5EF4-FFF2-40B4-BE49-F238E27FC236}">
+                <a16:creationId xmlns:a16="http://schemas.microsoft.com/office/drawing/2014/main" id="{D7C7D651-489D-4861-A8E0-E741EEF9D66D}"/>
+              </a:ext>
+            </a:extLst>
+          </p:cNvPr>
+          <p:cNvSpPr txBox="1">
+            <a:spLocks/>
+          </p:cNvSpPr>
+          <p:nvPr/>
+        </p:nvSpPr>
+        <p:spPr>
+          <a:xfrm>
+            <a:off x="8225561" y="997825"/>
+            <a:ext cx="2018754" cy="392558"/>
+          </a:xfrm>
+          <a:prstGeom prst="rect">
+            <a:avLst/>
+          </a:prstGeom>
+        </p:spPr>
+        <p:txBody>
+          <a:bodyPr vert="horz" lIns="91440" tIns="45720" rIns="91440" bIns="45720" rtlCol="0">
+            <a:noAutofit/>
+          </a:bodyPr>
+          <a:lstStyle>
+            <a:lvl1pPr marL="0" indent="0" algn="ctr" defTabSz="914400" rtl="0" eaLnBrk="1" latinLnBrk="0" hangingPunct="1">
+              <a:lnSpc>
+                <a:spcPct val="90000"/>
+              </a:lnSpc>
+              <a:spcBef>
+                <a:spcPts val="1000"/>
+              </a:spcBef>
+              <a:buFont typeface="Arial" panose="020B0604020202020204" pitchFamily="34" charset="0"/>
+              <a:buNone/>
+              <a:defRPr sz="2400" kern="1200">
+                <a:solidFill>
+                  <a:schemeClr val="tx1"/>
+                </a:solidFill>
+                <a:latin typeface="+mn-lt"/>
+                <a:ea typeface="+mn-ea"/>
+                <a:cs typeface="+mn-cs"/>
+              </a:defRPr>
+            </a:lvl1pPr>
+            <a:lvl2pPr marL="457200" indent="0" algn="ctr" defTabSz="914400" rtl="0" eaLnBrk="1" latinLnBrk="0" hangingPunct="1">
+              <a:lnSpc>
+                <a:spcPct val="90000"/>
+              </a:lnSpc>
+              <a:spcBef>
+                <a:spcPts val="500"/>
+              </a:spcBef>
+              <a:buFont typeface="Arial" panose="020B0604020202020204" pitchFamily="34" charset="0"/>
+              <a:buNone/>
+              <a:defRPr sz="2000" kern="1200">
+                <a:solidFill>
+                  <a:schemeClr val="tx1"/>
+                </a:solidFill>
+                <a:latin typeface="+mn-lt"/>
+                <a:ea typeface="+mn-ea"/>
+                <a:cs typeface="+mn-cs"/>
+              </a:defRPr>
+            </a:lvl2pPr>
+            <a:lvl3pPr marL="914400" indent="0" algn="ctr" defTabSz="914400" rtl="0" eaLnBrk="1" latinLnBrk="0" hangingPunct="1">
+              <a:lnSpc>
+                <a:spcPct val="90000"/>
+              </a:lnSpc>
+              <a:spcBef>
+                <a:spcPts val="500"/>
+              </a:spcBef>
+              <a:buFont typeface="Arial" panose="020B0604020202020204" pitchFamily="34" charset="0"/>
+              <a:buNone/>
+              <a:defRPr sz="1800" kern="1200">
+                <a:solidFill>
+                  <a:schemeClr val="tx1"/>
+                </a:solidFill>
+                <a:latin typeface="+mn-lt"/>
+                <a:ea typeface="+mn-ea"/>
+                <a:cs typeface="+mn-cs"/>
+              </a:defRPr>
+            </a:lvl3pPr>
+            <a:lvl4pPr marL="1371600" indent="0" algn="ctr" defTabSz="914400" rtl="0" eaLnBrk="1" latinLnBrk="0" hangingPunct="1">
+              <a:lnSpc>
+                <a:spcPct val="90000"/>
+              </a:lnSpc>
+              <a:spcBef>
+                <a:spcPts val="500"/>
+              </a:spcBef>
+              <a:buFont typeface="Arial" panose="020B0604020202020204" pitchFamily="34" charset="0"/>
+              <a:buNone/>
+              <a:defRPr sz="1600" kern="1200">
+                <a:solidFill>
+                  <a:schemeClr val="tx1"/>
+                </a:solidFill>
+                <a:latin typeface="+mn-lt"/>
+                <a:ea typeface="+mn-ea"/>
+                <a:cs typeface="+mn-cs"/>
+              </a:defRPr>
+            </a:lvl4pPr>
+            <a:lvl5pPr marL="1828800" indent="0" algn="ctr" defTabSz="914400" rtl="0" eaLnBrk="1" latinLnBrk="0" hangingPunct="1">
+              <a:lnSpc>
+                <a:spcPct val="90000"/>
+              </a:lnSpc>
+              <a:spcBef>
+                <a:spcPts val="500"/>
+              </a:spcBef>
+              <a:buFont typeface="Arial" panose="020B0604020202020204" pitchFamily="34" charset="0"/>
+              <a:buNone/>
+              <a:defRPr sz="1600" kern="1200">
+                <a:solidFill>
+                  <a:schemeClr val="tx1"/>
+                </a:solidFill>
+                <a:latin typeface="+mn-lt"/>
+                <a:ea typeface="+mn-ea"/>
+                <a:cs typeface="+mn-cs"/>
+              </a:defRPr>
+            </a:lvl5pPr>
+            <a:lvl6pPr marL="2286000" indent="0" algn="ctr" defTabSz="914400" rtl="0" eaLnBrk="1" latinLnBrk="0" hangingPunct="1">
+              <a:lnSpc>
+                <a:spcPct val="90000"/>
+              </a:lnSpc>
+              <a:spcBef>
+                <a:spcPts val="500"/>
+              </a:spcBef>
+              <a:buFont typeface="Arial" panose="020B0604020202020204" pitchFamily="34" charset="0"/>
+              <a:buNone/>
+              <a:defRPr sz="1600" kern="1200">
+                <a:solidFill>
+                  <a:schemeClr val="tx1"/>
+                </a:solidFill>
+                <a:latin typeface="+mn-lt"/>
+                <a:ea typeface="+mn-ea"/>
+                <a:cs typeface="+mn-cs"/>
+              </a:defRPr>
+            </a:lvl6pPr>
+            <a:lvl7pPr marL="2743200" indent="0" algn="ctr" defTabSz="914400" rtl="0" eaLnBrk="1" latinLnBrk="0" hangingPunct="1">
+              <a:lnSpc>
+                <a:spcPct val="90000"/>
+              </a:lnSpc>
+              <a:spcBef>
+                <a:spcPts val="500"/>
+              </a:spcBef>
+              <a:buFont typeface="Arial" panose="020B0604020202020204" pitchFamily="34" charset="0"/>
+              <a:buNone/>
+              <a:defRPr sz="1600" kern="1200">
+                <a:solidFill>
+                  <a:schemeClr val="tx1"/>
+                </a:solidFill>
+                <a:latin typeface="+mn-lt"/>
+                <a:ea typeface="+mn-ea"/>
+                <a:cs typeface="+mn-cs"/>
+              </a:defRPr>
+            </a:lvl7pPr>
+            <a:lvl8pPr marL="3200400" indent="0" algn="ctr" defTabSz="914400" rtl="0" eaLnBrk="1" latinLnBrk="0" hangingPunct="1">
+              <a:lnSpc>
+                <a:spcPct val="90000"/>
+              </a:lnSpc>
+              <a:spcBef>
+                <a:spcPts val="500"/>
+              </a:spcBef>
+              <a:buFont typeface="Arial" panose="020B0604020202020204" pitchFamily="34" charset="0"/>
+              <a:buNone/>
+              <a:defRPr sz="1600" kern="1200">
+                <a:solidFill>
+                  <a:schemeClr val="tx1"/>
+                </a:solidFill>
+                <a:latin typeface="+mn-lt"/>
+                <a:ea typeface="+mn-ea"/>
+                <a:cs typeface="+mn-cs"/>
+              </a:defRPr>
+            </a:lvl8pPr>
+            <a:lvl9pPr marL="3657600" indent="0" algn="ctr" defTabSz="914400" rtl="0" eaLnBrk="1" latinLnBrk="0" hangingPunct="1">
+              <a:lnSpc>
+                <a:spcPct val="90000"/>
+              </a:lnSpc>
+              <a:spcBef>
+                <a:spcPts val="500"/>
+              </a:spcBef>
+              <a:buFont typeface="Arial" panose="020B0604020202020204" pitchFamily="34" charset="0"/>
+              <a:buNone/>
+              <a:defRPr sz="1600" kern="1200">
+                <a:solidFill>
+                  <a:schemeClr val="tx1"/>
+                </a:solidFill>
+                <a:latin typeface="+mn-lt"/>
+                <a:ea typeface="+mn-ea"/>
+                <a:cs typeface="+mn-cs"/>
+              </a:defRPr>
+            </a:lvl9pPr>
+          </a:lstStyle>
+          <a:p>
+            <a:pPr algn="l"/>
+            <a:r>
+              <a:rPr lang="en-US" sz="1200" b="1" dirty="0"/>
+              <a:t>Iteratively (interval basis)</a:t>
+            </a:r>
+            <a:endParaRPr lang="en-US" sz="1200" dirty="0"/>
+          </a:p>
+        </p:txBody>
+      </p:sp>
+      <p:cxnSp>
+        <p:nvCxnSpPr>
+          <p:cNvPr id="14" name="Straight Arrow Connector 13">
+            <a:extLst>
+              <a:ext uri="{FF2B5EF4-FFF2-40B4-BE49-F238E27FC236}">
+                <a16:creationId xmlns:a16="http://schemas.microsoft.com/office/drawing/2014/main" id="{82C6AB97-C2CE-4A64-B7E6-CA2C6A94B7B0}"/>
+              </a:ext>
+            </a:extLst>
+          </p:cNvPr>
+          <p:cNvCxnSpPr>
+            <a:cxnSpLocks/>
+          </p:cNvCxnSpPr>
+          <p:nvPr/>
+        </p:nvCxnSpPr>
+        <p:spPr>
+          <a:xfrm>
+            <a:off x="6096000" y="1519770"/>
+            <a:ext cx="0" cy="4798734"/>
+          </a:xfrm>
+          <a:prstGeom prst="straightConnector1">
+            <a:avLst/>
+          </a:prstGeom>
+          <a:ln>
+            <a:prstDash val="dash"/>
+            <a:headEnd type="none" w="med" len="med"/>
+            <a:tailEnd type="none" w="med" len="med"/>
+          </a:ln>
+        </p:spPr>
+        <p:style>
+          <a:lnRef idx="1">
+            <a:schemeClr val="accent1"/>
+          </a:lnRef>
+          <a:fillRef idx="0">
+            <a:schemeClr val="accent1"/>
+          </a:fillRef>
+          <a:effectRef idx="0">
+            <a:schemeClr val="accent1"/>
+          </a:effectRef>
+          <a:fontRef idx="minor">
+            <a:schemeClr val="tx1"/>
+          </a:fontRef>
+        </p:style>
+      </p:cxnSp>
+      <p:sp>
+        <p:nvSpPr>
+          <p:cNvPr id="16" name="Rectangle 15">
+            <a:extLst>
+              <a:ext uri="{FF2B5EF4-FFF2-40B4-BE49-F238E27FC236}">
+                <a16:creationId xmlns:a16="http://schemas.microsoft.com/office/drawing/2014/main" id="{DA3E2D43-DEB3-45EC-BB95-6EC8E5878CC6}"/>
+              </a:ext>
+            </a:extLst>
+          </p:cNvPr>
+          <p:cNvSpPr/>
+          <p:nvPr/>
+        </p:nvSpPr>
+        <p:spPr>
+          <a:xfrm>
+            <a:off x="10079736" y="2681334"/>
+            <a:ext cx="1404140" cy="658367"/>
+          </a:xfrm>
+          <a:prstGeom prst="rect">
+            <a:avLst/>
+          </a:prstGeom>
+        </p:spPr>
+        <p:style>
+          <a:lnRef idx="2">
+            <a:schemeClr val="dk1"/>
+          </a:lnRef>
+          <a:fillRef idx="1">
+            <a:schemeClr val="lt1"/>
+          </a:fillRef>
+          <a:effectRef idx="0">
+            <a:schemeClr val="dk1"/>
+          </a:effectRef>
+          <a:fontRef idx="minor">
+            <a:schemeClr val="dk1"/>
+          </a:fontRef>
+        </p:style>
+        <p:txBody>
+          <a:bodyPr rtlCol="0" anchor="ctr"/>
+          <a:lstStyle/>
+          <a:p>
+            <a:pPr algn="ctr"/>
+            <a:r>
+              <a:rPr lang="en-SG" sz="1200" dirty="0"/>
+              <a:t>VWAP Retest</a:t>
+            </a:r>
+          </a:p>
+        </p:txBody>
+      </p:sp>
+      <p:sp>
+        <p:nvSpPr>
+          <p:cNvPr id="17" name="Diamond 16">
+            <a:extLst>
+              <a:ext uri="{FF2B5EF4-FFF2-40B4-BE49-F238E27FC236}">
+                <a16:creationId xmlns:a16="http://schemas.microsoft.com/office/drawing/2014/main" id="{1DEF0D67-CD48-49DC-ABF7-910C96575C04}"/>
+              </a:ext>
+            </a:extLst>
+          </p:cNvPr>
+          <p:cNvSpPr/>
+          <p:nvPr/>
+        </p:nvSpPr>
+        <p:spPr>
+          <a:xfrm>
+            <a:off x="6806685" y="4546710"/>
+            <a:ext cx="1404133" cy="1272714"/>
+          </a:xfrm>
+          <a:prstGeom prst="diamond">
+            <a:avLst/>
+          </a:prstGeom>
+        </p:spPr>
+        <p:style>
+          <a:lnRef idx="2">
+            <a:schemeClr val="dk1"/>
+          </a:lnRef>
+          <a:fillRef idx="1">
+            <a:schemeClr val="lt1"/>
+          </a:fillRef>
+          <a:effectRef idx="0">
+            <a:schemeClr val="dk1"/>
+          </a:effectRef>
+          <a:fontRef idx="minor">
+            <a:schemeClr val="dk1"/>
+          </a:fontRef>
+        </p:style>
+        <p:txBody>
+          <a:bodyPr rtlCol="0" anchor="ctr"/>
+          <a:lstStyle/>
+          <a:p>
+            <a:pPr algn="ctr"/>
+            <a:r>
+              <a:rPr lang="en-SG" sz="1100" dirty="0"/>
+              <a:t>For ticker_</a:t>
+            </a:r>
+            <a:br>
+              <a:rPr lang="en-SG" sz="1100" dirty="0"/>
+            </a:br>
+            <a:r>
+              <a:rPr lang="en-SG" sz="1100" dirty="0"/>
+              <a:t>symbol in watchlist</a:t>
+            </a:r>
+          </a:p>
+        </p:txBody>
+      </p:sp>
+      <p:sp>
+        <p:nvSpPr>
+          <p:cNvPr id="18" name="Rectangle 17">
+            <a:extLst>
+              <a:ext uri="{FF2B5EF4-FFF2-40B4-BE49-F238E27FC236}">
+                <a16:creationId xmlns:a16="http://schemas.microsoft.com/office/drawing/2014/main" id="{5BC86C4F-7E30-4D44-8A78-F846B172DF6C}"/>
+              </a:ext>
+            </a:extLst>
+          </p:cNvPr>
+          <p:cNvSpPr/>
+          <p:nvPr/>
+        </p:nvSpPr>
+        <p:spPr>
+          <a:xfrm>
+            <a:off x="10079736" y="3747542"/>
+            <a:ext cx="1404140" cy="658367"/>
+          </a:xfrm>
+          <a:prstGeom prst="rect">
+            <a:avLst/>
+          </a:prstGeom>
+        </p:spPr>
+        <p:style>
+          <a:lnRef idx="2">
+            <a:schemeClr val="dk1"/>
+          </a:lnRef>
+          <a:fillRef idx="1">
+            <a:schemeClr val="lt1"/>
+          </a:fillRef>
+          <a:effectRef idx="0">
+            <a:schemeClr val="dk1"/>
+          </a:effectRef>
+          <a:fontRef idx="minor">
+            <a:schemeClr val="dk1"/>
+          </a:fontRef>
+        </p:style>
+        <p:txBody>
+          <a:bodyPr rtlCol="0" anchor="ctr"/>
+          <a:lstStyle/>
+          <a:p>
+            <a:pPr algn="ctr"/>
+            <a:r>
+              <a:rPr lang="en-SG" sz="1200" dirty="0"/>
+              <a:t>EMA9 + VWAP Crossover</a:t>
+            </a:r>
+          </a:p>
+        </p:txBody>
+      </p:sp>
+      <p:sp>
+        <p:nvSpPr>
+          <p:cNvPr id="19" name="Rectangle 18">
+            <a:extLst>
+              <a:ext uri="{FF2B5EF4-FFF2-40B4-BE49-F238E27FC236}">
+                <a16:creationId xmlns:a16="http://schemas.microsoft.com/office/drawing/2014/main" id="{E3BA8E6D-BE8A-46F6-B401-8BD07C6710E9}"/>
+              </a:ext>
+            </a:extLst>
+          </p:cNvPr>
+          <p:cNvSpPr/>
+          <p:nvPr/>
+        </p:nvSpPr>
+        <p:spPr>
+          <a:xfrm>
+            <a:off x="10079736" y="4852191"/>
+            <a:ext cx="1404140" cy="658367"/>
+          </a:xfrm>
+          <a:prstGeom prst="rect">
+            <a:avLst/>
+          </a:prstGeom>
+        </p:spPr>
+        <p:style>
+          <a:lnRef idx="2">
+            <a:schemeClr val="dk1"/>
+          </a:lnRef>
+          <a:fillRef idx="1">
+            <a:schemeClr val="lt1"/>
+          </a:fillRef>
+          <a:effectRef idx="0">
+            <a:schemeClr val="dk1"/>
+          </a:effectRef>
+          <a:fontRef idx="minor">
+            <a:schemeClr val="dk1"/>
+          </a:fontRef>
+        </p:style>
+        <p:txBody>
+          <a:bodyPr rtlCol="0" anchor="ctr"/>
+          <a:lstStyle/>
+          <a:p>
+            <a:pPr algn="ctr"/>
+            <a:r>
+              <a:rPr lang="en-SG" sz="1200" dirty="0"/>
+              <a:t>Triple EMA</a:t>
+            </a:r>
+          </a:p>
+        </p:txBody>
+      </p:sp>
+      <p:cxnSp>
+        <p:nvCxnSpPr>
+          <p:cNvPr id="20" name="Straight Arrow Connector 19">
+            <a:extLst>
+              <a:ext uri="{FF2B5EF4-FFF2-40B4-BE49-F238E27FC236}">
+                <a16:creationId xmlns:a16="http://schemas.microsoft.com/office/drawing/2014/main" id="{CBBC393B-370B-4085-B430-D5910B63F588}"/>
+              </a:ext>
+            </a:extLst>
+          </p:cNvPr>
+          <p:cNvCxnSpPr>
+            <a:cxnSpLocks/>
+            <a:stCxn id="17" idx="3"/>
+            <a:endCxn id="19" idx="1"/>
+          </p:cNvCxnSpPr>
+          <p:nvPr/>
+        </p:nvCxnSpPr>
+        <p:spPr>
+          <a:xfrm flipV="1">
+            <a:off x="8210818" y="5181375"/>
+            <a:ext cx="1868918" cy="1692"/>
+          </a:xfrm>
+          <a:prstGeom prst="straightConnector1">
+            <a:avLst/>
+          </a:prstGeom>
+          <a:ln>
+            <a:tailEnd type="triangle"/>
+          </a:ln>
+        </p:spPr>
+        <p:style>
+          <a:lnRef idx="1">
+            <a:schemeClr val="accent1"/>
+          </a:lnRef>
+          <a:fillRef idx="0">
+            <a:schemeClr val="accent1"/>
+          </a:fillRef>
+          <a:effectRef idx="0">
+            <a:schemeClr val="accent1"/>
+          </a:effectRef>
+          <a:fontRef idx="minor">
+            <a:schemeClr val="tx1"/>
+          </a:fontRef>
+        </p:style>
+      </p:cxnSp>
+      <p:sp>
+        <p:nvSpPr>
+          <p:cNvPr id="23" name="Rectangle 22">
+            <a:extLst>
+              <a:ext uri="{FF2B5EF4-FFF2-40B4-BE49-F238E27FC236}">
+                <a16:creationId xmlns:a16="http://schemas.microsoft.com/office/drawing/2014/main" id="{133F09B5-9546-4311-A430-F314A80CE676}"/>
+              </a:ext>
+            </a:extLst>
+          </p:cNvPr>
+          <p:cNvSpPr/>
+          <p:nvPr/>
+        </p:nvSpPr>
+        <p:spPr>
+          <a:xfrm>
+            <a:off x="6617211" y="2675399"/>
+            <a:ext cx="1783080" cy="658367"/>
+          </a:xfrm>
+          <a:prstGeom prst="rect">
+            <a:avLst/>
+          </a:prstGeom>
+        </p:spPr>
+        <p:style>
+          <a:lnRef idx="2">
+            <a:schemeClr val="dk1"/>
+          </a:lnRef>
+          <a:fillRef idx="1">
+            <a:schemeClr val="lt1"/>
+          </a:fillRef>
+          <a:effectRef idx="0">
+            <a:schemeClr val="dk1"/>
+          </a:effectRef>
+          <a:fontRef idx="minor">
+            <a:schemeClr val="dk1"/>
+          </a:fontRef>
+        </p:style>
+        <p:txBody>
+          <a:bodyPr rtlCol="0" anchor="ctr"/>
+          <a:lstStyle/>
+          <a:p>
+            <a:pPr algn="ctr"/>
+            <a:r>
+              <a:rPr lang="en-SG" sz="1200" dirty="0"/>
+              <a:t>Dictionary of tickers + </a:t>
+            </a:r>
+            <a:r>
+              <a:rPr lang="en-SG" sz="1200" dirty="0" err="1"/>
+              <a:t>dataframes</a:t>
+            </a:r>
+            <a:endParaRPr lang="en-SG" sz="1200" dirty="0"/>
+          </a:p>
+        </p:txBody>
+      </p:sp>
+      <p:cxnSp>
+        <p:nvCxnSpPr>
+          <p:cNvPr id="24" name="Straight Arrow Connector 23">
+            <a:extLst>
+              <a:ext uri="{FF2B5EF4-FFF2-40B4-BE49-F238E27FC236}">
+                <a16:creationId xmlns:a16="http://schemas.microsoft.com/office/drawing/2014/main" id="{37993961-F591-4078-A9F5-AAC0FC50B0E9}"/>
+              </a:ext>
+            </a:extLst>
+          </p:cNvPr>
+          <p:cNvCxnSpPr>
+            <a:cxnSpLocks/>
+            <a:stCxn id="23" idx="2"/>
+            <a:endCxn id="17" idx="0"/>
+          </p:cNvCxnSpPr>
+          <p:nvPr/>
+        </p:nvCxnSpPr>
+        <p:spPr>
+          <a:xfrm>
+            <a:off x="7508751" y="3333766"/>
+            <a:ext cx="1" cy="1212944"/>
+          </a:xfrm>
+          <a:prstGeom prst="straightConnector1">
+            <a:avLst/>
+          </a:prstGeom>
+          <a:ln>
+            <a:tailEnd type="triangle"/>
+          </a:ln>
+        </p:spPr>
+        <p:style>
+          <a:lnRef idx="1">
+            <a:schemeClr val="accent1"/>
+          </a:lnRef>
+          <a:fillRef idx="0">
+            <a:schemeClr val="accent1"/>
+          </a:fillRef>
+          <a:effectRef idx="0">
+            <a:schemeClr val="accent1"/>
+          </a:effectRef>
+          <a:fontRef idx="minor">
+            <a:schemeClr val="tx1"/>
+          </a:fontRef>
+        </p:style>
+      </p:cxnSp>
+      <p:cxnSp>
+        <p:nvCxnSpPr>
+          <p:cNvPr id="27" name="Straight Arrow Connector 26">
+            <a:extLst>
+              <a:ext uri="{FF2B5EF4-FFF2-40B4-BE49-F238E27FC236}">
+                <a16:creationId xmlns:a16="http://schemas.microsoft.com/office/drawing/2014/main" id="{0A80A493-8AA3-458C-AC77-EE973DB19F8F}"/>
+              </a:ext>
+            </a:extLst>
+          </p:cNvPr>
+          <p:cNvCxnSpPr>
+            <a:cxnSpLocks/>
+            <a:endCxn id="18" idx="2"/>
+          </p:cNvCxnSpPr>
+          <p:nvPr/>
+        </p:nvCxnSpPr>
+        <p:spPr>
+          <a:xfrm flipV="1">
+            <a:off x="10781806" y="4405909"/>
+            <a:ext cx="0" cy="446282"/>
+          </a:xfrm>
+          <a:prstGeom prst="straightConnector1">
+            <a:avLst/>
+          </a:prstGeom>
+          <a:ln>
+            <a:tailEnd type="triangle"/>
+          </a:ln>
+        </p:spPr>
+        <p:style>
+          <a:lnRef idx="1">
+            <a:schemeClr val="accent1"/>
+          </a:lnRef>
+          <a:fillRef idx="0">
+            <a:schemeClr val="accent1"/>
+          </a:fillRef>
+          <a:effectRef idx="0">
+            <a:schemeClr val="accent1"/>
+          </a:effectRef>
+          <a:fontRef idx="minor">
+            <a:schemeClr val="tx1"/>
+          </a:fontRef>
+        </p:style>
+      </p:cxnSp>
+      <p:cxnSp>
+        <p:nvCxnSpPr>
+          <p:cNvPr id="30" name="Straight Arrow Connector 29">
+            <a:extLst>
+              <a:ext uri="{FF2B5EF4-FFF2-40B4-BE49-F238E27FC236}">
+                <a16:creationId xmlns:a16="http://schemas.microsoft.com/office/drawing/2014/main" id="{8706BFB5-3BA8-48C0-9BF9-B1A2D56ACF2B}"/>
+              </a:ext>
+            </a:extLst>
+          </p:cNvPr>
+          <p:cNvCxnSpPr>
+            <a:cxnSpLocks/>
+            <a:stCxn id="18" idx="0"/>
+          </p:cNvCxnSpPr>
+          <p:nvPr/>
+        </p:nvCxnSpPr>
+        <p:spPr>
+          <a:xfrm flipV="1">
+            <a:off x="10781806" y="3339702"/>
+            <a:ext cx="0" cy="407840"/>
+          </a:xfrm>
+          <a:prstGeom prst="straightConnector1">
+            <a:avLst/>
+          </a:prstGeom>
+          <a:ln>
+            <a:tailEnd type="triangle"/>
+          </a:ln>
+        </p:spPr>
+        <p:style>
+          <a:lnRef idx="1">
+            <a:schemeClr val="accent1"/>
+          </a:lnRef>
+          <a:fillRef idx="0">
+            <a:schemeClr val="accent1"/>
+          </a:fillRef>
+          <a:effectRef idx="0">
+            <a:schemeClr val="accent1"/>
+          </a:effectRef>
+          <a:fontRef idx="minor">
+            <a:schemeClr val="tx1"/>
+          </a:fontRef>
+        </p:style>
+      </p:cxnSp>
+      <p:cxnSp>
+        <p:nvCxnSpPr>
+          <p:cNvPr id="33" name="Straight Arrow Connector 32">
+            <a:extLst>
+              <a:ext uri="{FF2B5EF4-FFF2-40B4-BE49-F238E27FC236}">
+                <a16:creationId xmlns:a16="http://schemas.microsoft.com/office/drawing/2014/main" id="{6931A36A-F3EA-4CED-B69A-89FF32C9ACA3}"/>
+              </a:ext>
+            </a:extLst>
+          </p:cNvPr>
+          <p:cNvCxnSpPr>
+            <a:cxnSpLocks/>
+            <a:stCxn id="16" idx="1"/>
+            <a:endCxn id="23" idx="3"/>
+          </p:cNvCxnSpPr>
+          <p:nvPr/>
+        </p:nvCxnSpPr>
+        <p:spPr>
+          <a:xfrm flipH="1" flipV="1">
+            <a:off x="8400291" y="3004583"/>
+            <a:ext cx="1679445" cy="5935"/>
+          </a:xfrm>
+          <a:prstGeom prst="straightConnector1">
+            <a:avLst/>
+          </a:prstGeom>
+          <a:ln>
+            <a:tailEnd type="triangle"/>
+          </a:ln>
+        </p:spPr>
+        <p:style>
+          <a:lnRef idx="1">
+            <a:schemeClr val="accent1"/>
+          </a:lnRef>
+          <a:fillRef idx="0">
+            <a:schemeClr val="accent1"/>
+          </a:fillRef>
+          <a:effectRef idx="0">
+            <a:schemeClr val="accent1"/>
+          </a:effectRef>
+          <a:fontRef idx="minor">
+            <a:schemeClr val="tx1"/>
+          </a:fontRef>
+        </p:style>
+      </p:cxnSp>
+      <p:sp>
+        <p:nvSpPr>
+          <p:cNvPr id="36" name="Subtitle 2">
+            <a:extLst>
+              <a:ext uri="{FF2B5EF4-FFF2-40B4-BE49-F238E27FC236}">
+                <a16:creationId xmlns:a16="http://schemas.microsoft.com/office/drawing/2014/main" id="{26C9E0CE-D962-460D-AEFE-88765186EAAB}"/>
+              </a:ext>
+            </a:extLst>
+          </p:cNvPr>
+          <p:cNvSpPr txBox="1">
+            <a:spLocks/>
+          </p:cNvSpPr>
+          <p:nvPr/>
+        </p:nvSpPr>
+        <p:spPr>
+          <a:xfrm>
+            <a:off x="8693382" y="3050178"/>
+            <a:ext cx="1404140" cy="392558"/>
+          </a:xfrm>
+          <a:prstGeom prst="rect">
+            <a:avLst/>
+          </a:prstGeom>
+        </p:spPr>
+        <p:txBody>
+          <a:bodyPr vert="horz" lIns="91440" tIns="45720" rIns="91440" bIns="45720" rtlCol="0">
+            <a:noAutofit/>
+          </a:bodyPr>
+          <a:lstStyle>
+            <a:lvl1pPr marL="0" indent="0" algn="ctr" defTabSz="914400" rtl="0" eaLnBrk="1" latinLnBrk="0" hangingPunct="1">
+              <a:lnSpc>
+                <a:spcPct val="90000"/>
+              </a:lnSpc>
+              <a:spcBef>
+                <a:spcPts val="1000"/>
+              </a:spcBef>
+              <a:buFont typeface="Arial" panose="020B0604020202020204" pitchFamily="34" charset="0"/>
+              <a:buNone/>
+              <a:defRPr sz="2400" kern="1200">
+                <a:solidFill>
+                  <a:schemeClr val="tx1"/>
+                </a:solidFill>
+                <a:latin typeface="+mn-lt"/>
+                <a:ea typeface="+mn-ea"/>
+                <a:cs typeface="+mn-cs"/>
+              </a:defRPr>
+            </a:lvl1pPr>
+            <a:lvl2pPr marL="457200" indent="0" algn="ctr" defTabSz="914400" rtl="0" eaLnBrk="1" latinLnBrk="0" hangingPunct="1">
+              <a:lnSpc>
+                <a:spcPct val="90000"/>
+              </a:lnSpc>
+              <a:spcBef>
+                <a:spcPts val="500"/>
+              </a:spcBef>
+              <a:buFont typeface="Arial" panose="020B0604020202020204" pitchFamily="34" charset="0"/>
+              <a:buNone/>
+              <a:defRPr sz="2000" kern="1200">
+                <a:solidFill>
+                  <a:schemeClr val="tx1"/>
+                </a:solidFill>
+                <a:latin typeface="+mn-lt"/>
+                <a:ea typeface="+mn-ea"/>
+                <a:cs typeface="+mn-cs"/>
+              </a:defRPr>
+            </a:lvl2pPr>
+            <a:lvl3pPr marL="914400" indent="0" algn="ctr" defTabSz="914400" rtl="0" eaLnBrk="1" latinLnBrk="0" hangingPunct="1">
+              <a:lnSpc>
+                <a:spcPct val="90000"/>
+              </a:lnSpc>
+              <a:spcBef>
+                <a:spcPts val="500"/>
+              </a:spcBef>
+              <a:buFont typeface="Arial" panose="020B0604020202020204" pitchFamily="34" charset="0"/>
+              <a:buNone/>
+              <a:defRPr sz="1800" kern="1200">
+                <a:solidFill>
+                  <a:schemeClr val="tx1"/>
+                </a:solidFill>
+                <a:latin typeface="+mn-lt"/>
+                <a:ea typeface="+mn-ea"/>
+                <a:cs typeface="+mn-cs"/>
+              </a:defRPr>
+            </a:lvl3pPr>
+            <a:lvl4pPr marL="1371600" indent="0" algn="ctr" defTabSz="914400" rtl="0" eaLnBrk="1" latinLnBrk="0" hangingPunct="1">
+              <a:lnSpc>
+                <a:spcPct val="90000"/>
+              </a:lnSpc>
+              <a:spcBef>
+                <a:spcPts val="500"/>
+              </a:spcBef>
+              <a:buFont typeface="Arial" panose="020B0604020202020204" pitchFamily="34" charset="0"/>
+              <a:buNone/>
+              <a:defRPr sz="1600" kern="1200">
+                <a:solidFill>
+                  <a:schemeClr val="tx1"/>
+                </a:solidFill>
+                <a:latin typeface="+mn-lt"/>
+                <a:ea typeface="+mn-ea"/>
+                <a:cs typeface="+mn-cs"/>
+              </a:defRPr>
+            </a:lvl4pPr>
+            <a:lvl5pPr marL="1828800" indent="0" algn="ctr" defTabSz="914400" rtl="0" eaLnBrk="1" latinLnBrk="0" hangingPunct="1">
+              <a:lnSpc>
+                <a:spcPct val="90000"/>
+              </a:lnSpc>
+              <a:spcBef>
+                <a:spcPts val="500"/>
+              </a:spcBef>
+              <a:buFont typeface="Arial" panose="020B0604020202020204" pitchFamily="34" charset="0"/>
+              <a:buNone/>
+              <a:defRPr sz="1600" kern="1200">
+                <a:solidFill>
+                  <a:schemeClr val="tx1"/>
+                </a:solidFill>
+                <a:latin typeface="+mn-lt"/>
+                <a:ea typeface="+mn-ea"/>
+                <a:cs typeface="+mn-cs"/>
+              </a:defRPr>
+            </a:lvl5pPr>
+            <a:lvl6pPr marL="2286000" indent="0" algn="ctr" defTabSz="914400" rtl="0" eaLnBrk="1" latinLnBrk="0" hangingPunct="1">
+              <a:lnSpc>
+                <a:spcPct val="90000"/>
+              </a:lnSpc>
+              <a:spcBef>
+                <a:spcPts val="500"/>
+              </a:spcBef>
+              <a:buFont typeface="Arial" panose="020B0604020202020204" pitchFamily="34" charset="0"/>
+              <a:buNone/>
+              <a:defRPr sz="1600" kern="1200">
+                <a:solidFill>
+                  <a:schemeClr val="tx1"/>
+                </a:solidFill>
+                <a:latin typeface="+mn-lt"/>
+                <a:ea typeface="+mn-ea"/>
+                <a:cs typeface="+mn-cs"/>
+              </a:defRPr>
+            </a:lvl6pPr>
+            <a:lvl7pPr marL="2743200" indent="0" algn="ctr" defTabSz="914400" rtl="0" eaLnBrk="1" latinLnBrk="0" hangingPunct="1">
+              <a:lnSpc>
+                <a:spcPct val="90000"/>
+              </a:lnSpc>
+              <a:spcBef>
+                <a:spcPts val="500"/>
+              </a:spcBef>
+              <a:buFont typeface="Arial" panose="020B0604020202020204" pitchFamily="34" charset="0"/>
+              <a:buNone/>
+              <a:defRPr sz="1600" kern="1200">
+                <a:solidFill>
+                  <a:schemeClr val="tx1"/>
+                </a:solidFill>
+                <a:latin typeface="+mn-lt"/>
+                <a:ea typeface="+mn-ea"/>
+                <a:cs typeface="+mn-cs"/>
+              </a:defRPr>
+            </a:lvl7pPr>
+            <a:lvl8pPr marL="3200400" indent="0" algn="ctr" defTabSz="914400" rtl="0" eaLnBrk="1" latinLnBrk="0" hangingPunct="1">
+              <a:lnSpc>
+                <a:spcPct val="90000"/>
+              </a:lnSpc>
+              <a:spcBef>
+                <a:spcPts val="500"/>
+              </a:spcBef>
+              <a:buFont typeface="Arial" panose="020B0604020202020204" pitchFamily="34" charset="0"/>
+              <a:buNone/>
+              <a:defRPr sz="1600" kern="1200">
+                <a:solidFill>
+                  <a:schemeClr val="tx1"/>
+                </a:solidFill>
+                <a:latin typeface="+mn-lt"/>
+                <a:ea typeface="+mn-ea"/>
+                <a:cs typeface="+mn-cs"/>
+              </a:defRPr>
+            </a:lvl8pPr>
+            <a:lvl9pPr marL="3657600" indent="0" algn="ctr" defTabSz="914400" rtl="0" eaLnBrk="1" latinLnBrk="0" hangingPunct="1">
+              <a:lnSpc>
+                <a:spcPct val="90000"/>
+              </a:lnSpc>
+              <a:spcBef>
+                <a:spcPts val="500"/>
+              </a:spcBef>
+              <a:buFont typeface="Arial" panose="020B0604020202020204" pitchFamily="34" charset="0"/>
+              <a:buNone/>
+              <a:defRPr sz="1600" kern="1200">
+                <a:solidFill>
+                  <a:schemeClr val="tx1"/>
+                </a:solidFill>
+                <a:latin typeface="+mn-lt"/>
+                <a:ea typeface="+mn-ea"/>
+                <a:cs typeface="+mn-cs"/>
+              </a:defRPr>
+            </a:lvl9pPr>
+          </a:lstStyle>
+          <a:p>
+            <a:pPr algn="l"/>
+            <a:r>
+              <a:rPr lang="en-US" sz="1200" b="1" dirty="0"/>
+              <a:t>Save </a:t>
+            </a:r>
+            <a:r>
+              <a:rPr lang="en-US" sz="1200" b="1" dirty="0" err="1"/>
+              <a:t>result_df</a:t>
+            </a:r>
+            <a:r>
+              <a:rPr lang="en-US" sz="1200" b="1" dirty="0"/>
+              <a:t> to dictionary</a:t>
+            </a:r>
+          </a:p>
+          <a:p>
+            <a:pPr algn="l"/>
+            <a:endParaRPr lang="en-US" sz="1200" dirty="0"/>
+          </a:p>
+        </p:txBody>
+      </p:sp>
+      <p:sp>
+        <p:nvSpPr>
+          <p:cNvPr id="37" name="Subtitle 2">
+            <a:extLst>
+              <a:ext uri="{FF2B5EF4-FFF2-40B4-BE49-F238E27FC236}">
+                <a16:creationId xmlns:a16="http://schemas.microsoft.com/office/drawing/2014/main" id="{A82CFECE-D758-4A32-A343-438A5FB58F92}"/>
+              </a:ext>
+            </a:extLst>
+          </p:cNvPr>
+          <p:cNvSpPr txBox="1">
+            <a:spLocks/>
+          </p:cNvSpPr>
+          <p:nvPr/>
+        </p:nvSpPr>
+        <p:spPr>
+          <a:xfrm>
+            <a:off x="8378958" y="4754162"/>
+            <a:ext cx="1404140" cy="392558"/>
+          </a:xfrm>
+          <a:prstGeom prst="rect">
+            <a:avLst/>
+          </a:prstGeom>
+        </p:spPr>
+        <p:txBody>
+          <a:bodyPr vert="horz" lIns="91440" tIns="45720" rIns="91440" bIns="45720" rtlCol="0">
+            <a:noAutofit/>
+          </a:bodyPr>
+          <a:lstStyle>
+            <a:lvl1pPr marL="0" indent="0" algn="ctr" defTabSz="914400" rtl="0" eaLnBrk="1" latinLnBrk="0" hangingPunct="1">
+              <a:lnSpc>
+                <a:spcPct val="90000"/>
+              </a:lnSpc>
+              <a:spcBef>
+                <a:spcPts val="1000"/>
+              </a:spcBef>
+              <a:buFont typeface="Arial" panose="020B0604020202020204" pitchFamily="34" charset="0"/>
+              <a:buNone/>
+              <a:defRPr sz="2400" kern="1200">
+                <a:solidFill>
+                  <a:schemeClr val="tx1"/>
+                </a:solidFill>
+                <a:latin typeface="+mn-lt"/>
+                <a:ea typeface="+mn-ea"/>
+                <a:cs typeface="+mn-cs"/>
+              </a:defRPr>
+            </a:lvl1pPr>
+            <a:lvl2pPr marL="457200" indent="0" algn="ctr" defTabSz="914400" rtl="0" eaLnBrk="1" latinLnBrk="0" hangingPunct="1">
+              <a:lnSpc>
+                <a:spcPct val="90000"/>
+              </a:lnSpc>
+              <a:spcBef>
+                <a:spcPts val="500"/>
+              </a:spcBef>
+              <a:buFont typeface="Arial" panose="020B0604020202020204" pitchFamily="34" charset="0"/>
+              <a:buNone/>
+              <a:defRPr sz="2000" kern="1200">
+                <a:solidFill>
+                  <a:schemeClr val="tx1"/>
+                </a:solidFill>
+                <a:latin typeface="+mn-lt"/>
+                <a:ea typeface="+mn-ea"/>
+                <a:cs typeface="+mn-cs"/>
+              </a:defRPr>
+            </a:lvl2pPr>
+            <a:lvl3pPr marL="914400" indent="0" algn="ctr" defTabSz="914400" rtl="0" eaLnBrk="1" latinLnBrk="0" hangingPunct="1">
+              <a:lnSpc>
+                <a:spcPct val="90000"/>
+              </a:lnSpc>
+              <a:spcBef>
+                <a:spcPts val="500"/>
+              </a:spcBef>
+              <a:buFont typeface="Arial" panose="020B0604020202020204" pitchFamily="34" charset="0"/>
+              <a:buNone/>
+              <a:defRPr sz="1800" kern="1200">
+                <a:solidFill>
+                  <a:schemeClr val="tx1"/>
+                </a:solidFill>
+                <a:latin typeface="+mn-lt"/>
+                <a:ea typeface="+mn-ea"/>
+                <a:cs typeface="+mn-cs"/>
+              </a:defRPr>
+            </a:lvl3pPr>
+            <a:lvl4pPr marL="1371600" indent="0" algn="ctr" defTabSz="914400" rtl="0" eaLnBrk="1" latinLnBrk="0" hangingPunct="1">
+              <a:lnSpc>
+                <a:spcPct val="90000"/>
+              </a:lnSpc>
+              <a:spcBef>
+                <a:spcPts val="500"/>
+              </a:spcBef>
+              <a:buFont typeface="Arial" panose="020B0604020202020204" pitchFamily="34" charset="0"/>
+              <a:buNone/>
+              <a:defRPr sz="1600" kern="1200">
+                <a:solidFill>
+                  <a:schemeClr val="tx1"/>
+                </a:solidFill>
+                <a:latin typeface="+mn-lt"/>
+                <a:ea typeface="+mn-ea"/>
+                <a:cs typeface="+mn-cs"/>
+              </a:defRPr>
+            </a:lvl4pPr>
+            <a:lvl5pPr marL="1828800" indent="0" algn="ctr" defTabSz="914400" rtl="0" eaLnBrk="1" latinLnBrk="0" hangingPunct="1">
+              <a:lnSpc>
+                <a:spcPct val="90000"/>
+              </a:lnSpc>
+              <a:spcBef>
+                <a:spcPts val="500"/>
+              </a:spcBef>
+              <a:buFont typeface="Arial" panose="020B0604020202020204" pitchFamily="34" charset="0"/>
+              <a:buNone/>
+              <a:defRPr sz="1600" kern="1200">
+                <a:solidFill>
+                  <a:schemeClr val="tx1"/>
+                </a:solidFill>
+                <a:latin typeface="+mn-lt"/>
+                <a:ea typeface="+mn-ea"/>
+                <a:cs typeface="+mn-cs"/>
+              </a:defRPr>
+            </a:lvl5pPr>
+            <a:lvl6pPr marL="2286000" indent="0" algn="ctr" defTabSz="914400" rtl="0" eaLnBrk="1" latinLnBrk="0" hangingPunct="1">
+              <a:lnSpc>
+                <a:spcPct val="90000"/>
+              </a:lnSpc>
+              <a:spcBef>
+                <a:spcPts val="500"/>
+              </a:spcBef>
+              <a:buFont typeface="Arial" panose="020B0604020202020204" pitchFamily="34" charset="0"/>
+              <a:buNone/>
+              <a:defRPr sz="1600" kern="1200">
+                <a:solidFill>
+                  <a:schemeClr val="tx1"/>
+                </a:solidFill>
+                <a:latin typeface="+mn-lt"/>
+                <a:ea typeface="+mn-ea"/>
+                <a:cs typeface="+mn-cs"/>
+              </a:defRPr>
+            </a:lvl6pPr>
+            <a:lvl7pPr marL="2743200" indent="0" algn="ctr" defTabSz="914400" rtl="0" eaLnBrk="1" latinLnBrk="0" hangingPunct="1">
+              <a:lnSpc>
+                <a:spcPct val="90000"/>
+              </a:lnSpc>
+              <a:spcBef>
+                <a:spcPts val="500"/>
+              </a:spcBef>
+              <a:buFont typeface="Arial" panose="020B0604020202020204" pitchFamily="34" charset="0"/>
+              <a:buNone/>
+              <a:defRPr sz="1600" kern="1200">
+                <a:solidFill>
+                  <a:schemeClr val="tx1"/>
+                </a:solidFill>
+                <a:latin typeface="+mn-lt"/>
+                <a:ea typeface="+mn-ea"/>
+                <a:cs typeface="+mn-cs"/>
+              </a:defRPr>
+            </a:lvl7pPr>
+            <a:lvl8pPr marL="3200400" indent="0" algn="ctr" defTabSz="914400" rtl="0" eaLnBrk="1" latinLnBrk="0" hangingPunct="1">
+              <a:lnSpc>
+                <a:spcPct val="90000"/>
+              </a:lnSpc>
+              <a:spcBef>
+                <a:spcPts val="500"/>
+              </a:spcBef>
+              <a:buFont typeface="Arial" panose="020B0604020202020204" pitchFamily="34" charset="0"/>
+              <a:buNone/>
+              <a:defRPr sz="1600" kern="1200">
+                <a:solidFill>
+                  <a:schemeClr val="tx1"/>
+                </a:solidFill>
+                <a:latin typeface="+mn-lt"/>
+                <a:ea typeface="+mn-ea"/>
+                <a:cs typeface="+mn-cs"/>
+              </a:defRPr>
+            </a:lvl8pPr>
+            <a:lvl9pPr marL="3657600" indent="0" algn="ctr" defTabSz="914400" rtl="0" eaLnBrk="1" latinLnBrk="0" hangingPunct="1">
+              <a:lnSpc>
+                <a:spcPct val="90000"/>
+              </a:lnSpc>
+              <a:spcBef>
+                <a:spcPts val="500"/>
+              </a:spcBef>
+              <a:buFont typeface="Arial" panose="020B0604020202020204" pitchFamily="34" charset="0"/>
+              <a:buNone/>
+              <a:defRPr sz="1600" kern="1200">
+                <a:solidFill>
+                  <a:schemeClr val="tx1"/>
+                </a:solidFill>
+                <a:latin typeface="+mn-lt"/>
+                <a:ea typeface="+mn-ea"/>
+                <a:cs typeface="+mn-cs"/>
+              </a:defRPr>
+            </a:lvl9pPr>
+          </a:lstStyle>
+          <a:p>
+            <a:pPr algn="l"/>
+            <a:r>
+              <a:rPr lang="en-US" sz="1200" b="1" dirty="0"/>
+              <a:t>e.g. Ticker “MSFT"</a:t>
+            </a:r>
+          </a:p>
+          <a:p>
+            <a:pPr algn="l"/>
+            <a:endParaRPr lang="en-US" sz="1200" dirty="0"/>
+          </a:p>
+        </p:txBody>
+      </p:sp>
+      <p:sp>
+        <p:nvSpPr>
+          <p:cNvPr id="43" name="Rectangle 42">
+            <a:extLst>
+              <a:ext uri="{FF2B5EF4-FFF2-40B4-BE49-F238E27FC236}">
+                <a16:creationId xmlns:a16="http://schemas.microsoft.com/office/drawing/2014/main" id="{B3A3CF23-6DD8-49C7-AEA9-AA5C1B72C9A3}"/>
+              </a:ext>
+            </a:extLst>
+          </p:cNvPr>
+          <p:cNvSpPr/>
+          <p:nvPr/>
+        </p:nvSpPr>
+        <p:spPr>
+          <a:xfrm>
+            <a:off x="6624682" y="1937943"/>
+            <a:ext cx="1783080" cy="658367"/>
+          </a:xfrm>
+          <a:prstGeom prst="rect">
+            <a:avLst/>
+          </a:prstGeom>
+        </p:spPr>
+        <p:style>
+          <a:lnRef idx="2">
+            <a:schemeClr val="dk1"/>
+          </a:lnRef>
+          <a:fillRef idx="1">
+            <a:schemeClr val="lt1"/>
+          </a:fillRef>
+          <a:effectRef idx="0">
+            <a:schemeClr val="dk1"/>
+          </a:effectRef>
+          <a:fontRef idx="minor">
+            <a:schemeClr val="dk1"/>
+          </a:fontRef>
+        </p:style>
+        <p:txBody>
+          <a:bodyPr rtlCol="0" anchor="ctr"/>
+          <a:lstStyle/>
+          <a:p>
+            <a:pPr algn="ctr"/>
+            <a:r>
+              <a:rPr lang="en-SG" sz="1200" dirty="0"/>
+              <a:t>Dashboard</a:t>
+            </a:r>
+          </a:p>
+        </p:txBody>
+      </p:sp>
+      <p:cxnSp>
+        <p:nvCxnSpPr>
+          <p:cNvPr id="45" name="Connector: Elbow 44">
+            <a:extLst>
+              <a:ext uri="{FF2B5EF4-FFF2-40B4-BE49-F238E27FC236}">
+                <a16:creationId xmlns:a16="http://schemas.microsoft.com/office/drawing/2014/main" id="{ACC4A75C-8A6C-4EBE-B45C-171950E64F4E}"/>
+              </a:ext>
+            </a:extLst>
+          </p:cNvPr>
+          <p:cNvCxnSpPr>
+            <a:endCxn id="43" idx="3"/>
+          </p:cNvCxnSpPr>
+          <p:nvPr/>
+        </p:nvCxnSpPr>
+        <p:spPr>
+          <a:xfrm rot="10800000">
+            <a:off x="8407763" y="2267128"/>
+            <a:ext cx="737515" cy="737455"/>
+          </a:xfrm>
+          <a:prstGeom prst="bentConnector3">
+            <a:avLst>
+              <a:gd name="adj1" fmla="val -678"/>
+            </a:avLst>
+          </a:prstGeom>
+          <a:ln>
+            <a:tailEnd type="triangle"/>
+          </a:ln>
+        </p:spPr>
+        <p:style>
+          <a:lnRef idx="1">
+            <a:schemeClr val="accent1"/>
+          </a:lnRef>
+          <a:fillRef idx="0">
+            <a:schemeClr val="accent1"/>
+          </a:fillRef>
+          <a:effectRef idx="0">
+            <a:schemeClr val="accent1"/>
+          </a:effectRef>
+          <a:fontRef idx="minor">
+            <a:schemeClr val="tx1"/>
+          </a:fontRef>
+        </p:style>
+      </p:cxnSp>
+      <p:sp>
+        <p:nvSpPr>
+          <p:cNvPr id="48" name="Subtitle 2">
+            <a:extLst>
+              <a:ext uri="{FF2B5EF4-FFF2-40B4-BE49-F238E27FC236}">
+                <a16:creationId xmlns:a16="http://schemas.microsoft.com/office/drawing/2014/main" id="{CBBBD4CB-EA64-4029-9EAE-1C9EBCC9C7D3}"/>
+              </a:ext>
+            </a:extLst>
+          </p:cNvPr>
+          <p:cNvSpPr txBox="1">
+            <a:spLocks/>
+          </p:cNvSpPr>
+          <p:nvPr/>
+        </p:nvSpPr>
+        <p:spPr>
+          <a:xfrm>
+            <a:off x="8478654" y="2003560"/>
+            <a:ext cx="1765661" cy="269933"/>
+          </a:xfrm>
+          <a:prstGeom prst="rect">
+            <a:avLst/>
+          </a:prstGeom>
+        </p:spPr>
+        <p:txBody>
+          <a:bodyPr vert="horz" lIns="91440" tIns="45720" rIns="91440" bIns="45720" rtlCol="0">
+            <a:noAutofit/>
+          </a:bodyPr>
+          <a:lstStyle>
+            <a:lvl1pPr marL="0" indent="0" algn="ctr" defTabSz="914400" rtl="0" eaLnBrk="1" latinLnBrk="0" hangingPunct="1">
+              <a:lnSpc>
+                <a:spcPct val="90000"/>
+              </a:lnSpc>
+              <a:spcBef>
+                <a:spcPts val="1000"/>
+              </a:spcBef>
+              <a:buFont typeface="Arial" panose="020B0604020202020204" pitchFamily="34" charset="0"/>
+              <a:buNone/>
+              <a:defRPr sz="2400" kern="1200">
+                <a:solidFill>
+                  <a:schemeClr val="tx1"/>
+                </a:solidFill>
+                <a:latin typeface="+mn-lt"/>
+                <a:ea typeface="+mn-ea"/>
+                <a:cs typeface="+mn-cs"/>
+              </a:defRPr>
+            </a:lvl1pPr>
+            <a:lvl2pPr marL="457200" indent="0" algn="ctr" defTabSz="914400" rtl="0" eaLnBrk="1" latinLnBrk="0" hangingPunct="1">
+              <a:lnSpc>
+                <a:spcPct val="90000"/>
+              </a:lnSpc>
+              <a:spcBef>
+                <a:spcPts val="500"/>
+              </a:spcBef>
+              <a:buFont typeface="Arial" panose="020B0604020202020204" pitchFamily="34" charset="0"/>
+              <a:buNone/>
+              <a:defRPr sz="2000" kern="1200">
+                <a:solidFill>
+                  <a:schemeClr val="tx1"/>
+                </a:solidFill>
+                <a:latin typeface="+mn-lt"/>
+                <a:ea typeface="+mn-ea"/>
+                <a:cs typeface="+mn-cs"/>
+              </a:defRPr>
+            </a:lvl2pPr>
+            <a:lvl3pPr marL="914400" indent="0" algn="ctr" defTabSz="914400" rtl="0" eaLnBrk="1" latinLnBrk="0" hangingPunct="1">
+              <a:lnSpc>
+                <a:spcPct val="90000"/>
+              </a:lnSpc>
+              <a:spcBef>
+                <a:spcPts val="500"/>
+              </a:spcBef>
+              <a:buFont typeface="Arial" panose="020B0604020202020204" pitchFamily="34" charset="0"/>
+              <a:buNone/>
+              <a:defRPr sz="1800" kern="1200">
+                <a:solidFill>
+                  <a:schemeClr val="tx1"/>
+                </a:solidFill>
+                <a:latin typeface="+mn-lt"/>
+                <a:ea typeface="+mn-ea"/>
+                <a:cs typeface="+mn-cs"/>
+              </a:defRPr>
+            </a:lvl3pPr>
+            <a:lvl4pPr marL="1371600" indent="0" algn="ctr" defTabSz="914400" rtl="0" eaLnBrk="1" latinLnBrk="0" hangingPunct="1">
+              <a:lnSpc>
+                <a:spcPct val="90000"/>
+              </a:lnSpc>
+              <a:spcBef>
+                <a:spcPts val="500"/>
+              </a:spcBef>
+              <a:buFont typeface="Arial" panose="020B0604020202020204" pitchFamily="34" charset="0"/>
+              <a:buNone/>
+              <a:defRPr sz="1600" kern="1200">
+                <a:solidFill>
+                  <a:schemeClr val="tx1"/>
+                </a:solidFill>
+                <a:latin typeface="+mn-lt"/>
+                <a:ea typeface="+mn-ea"/>
+                <a:cs typeface="+mn-cs"/>
+              </a:defRPr>
+            </a:lvl4pPr>
+            <a:lvl5pPr marL="1828800" indent="0" algn="ctr" defTabSz="914400" rtl="0" eaLnBrk="1" latinLnBrk="0" hangingPunct="1">
+              <a:lnSpc>
+                <a:spcPct val="90000"/>
+              </a:lnSpc>
+              <a:spcBef>
+                <a:spcPts val="500"/>
+              </a:spcBef>
+              <a:buFont typeface="Arial" panose="020B0604020202020204" pitchFamily="34" charset="0"/>
+              <a:buNone/>
+              <a:defRPr sz="1600" kern="1200">
+                <a:solidFill>
+                  <a:schemeClr val="tx1"/>
+                </a:solidFill>
+                <a:latin typeface="+mn-lt"/>
+                <a:ea typeface="+mn-ea"/>
+                <a:cs typeface="+mn-cs"/>
+              </a:defRPr>
+            </a:lvl5pPr>
+            <a:lvl6pPr marL="2286000" indent="0" algn="ctr" defTabSz="914400" rtl="0" eaLnBrk="1" latinLnBrk="0" hangingPunct="1">
+              <a:lnSpc>
+                <a:spcPct val="90000"/>
+              </a:lnSpc>
+              <a:spcBef>
+                <a:spcPts val="500"/>
+              </a:spcBef>
+              <a:buFont typeface="Arial" panose="020B0604020202020204" pitchFamily="34" charset="0"/>
+              <a:buNone/>
+              <a:defRPr sz="1600" kern="1200">
+                <a:solidFill>
+                  <a:schemeClr val="tx1"/>
+                </a:solidFill>
+                <a:latin typeface="+mn-lt"/>
+                <a:ea typeface="+mn-ea"/>
+                <a:cs typeface="+mn-cs"/>
+              </a:defRPr>
+            </a:lvl6pPr>
+            <a:lvl7pPr marL="2743200" indent="0" algn="ctr" defTabSz="914400" rtl="0" eaLnBrk="1" latinLnBrk="0" hangingPunct="1">
+              <a:lnSpc>
+                <a:spcPct val="90000"/>
+              </a:lnSpc>
+              <a:spcBef>
+                <a:spcPts val="500"/>
+              </a:spcBef>
+              <a:buFont typeface="Arial" panose="020B0604020202020204" pitchFamily="34" charset="0"/>
+              <a:buNone/>
+              <a:defRPr sz="1600" kern="1200">
+                <a:solidFill>
+                  <a:schemeClr val="tx1"/>
+                </a:solidFill>
+                <a:latin typeface="+mn-lt"/>
+                <a:ea typeface="+mn-ea"/>
+                <a:cs typeface="+mn-cs"/>
+              </a:defRPr>
+            </a:lvl7pPr>
+            <a:lvl8pPr marL="3200400" indent="0" algn="ctr" defTabSz="914400" rtl="0" eaLnBrk="1" latinLnBrk="0" hangingPunct="1">
+              <a:lnSpc>
+                <a:spcPct val="90000"/>
+              </a:lnSpc>
+              <a:spcBef>
+                <a:spcPts val="500"/>
+              </a:spcBef>
+              <a:buFont typeface="Arial" panose="020B0604020202020204" pitchFamily="34" charset="0"/>
+              <a:buNone/>
+              <a:defRPr sz="1600" kern="1200">
+                <a:solidFill>
+                  <a:schemeClr val="tx1"/>
+                </a:solidFill>
+                <a:latin typeface="+mn-lt"/>
+                <a:ea typeface="+mn-ea"/>
+                <a:cs typeface="+mn-cs"/>
+              </a:defRPr>
+            </a:lvl8pPr>
+            <a:lvl9pPr marL="3657600" indent="0" algn="ctr" defTabSz="914400" rtl="0" eaLnBrk="1" latinLnBrk="0" hangingPunct="1">
+              <a:lnSpc>
+                <a:spcPct val="90000"/>
+              </a:lnSpc>
+              <a:spcBef>
+                <a:spcPts val="500"/>
+              </a:spcBef>
+              <a:buFont typeface="Arial" panose="020B0604020202020204" pitchFamily="34" charset="0"/>
+              <a:buNone/>
+              <a:defRPr sz="1600" kern="1200">
+                <a:solidFill>
+                  <a:schemeClr val="tx1"/>
+                </a:solidFill>
+                <a:latin typeface="+mn-lt"/>
+                <a:ea typeface="+mn-ea"/>
+                <a:cs typeface="+mn-cs"/>
+              </a:defRPr>
+            </a:lvl9pPr>
+          </a:lstStyle>
+          <a:p>
+            <a:pPr algn="l"/>
+            <a:r>
+              <a:rPr lang="en-US" sz="1200" b="1" dirty="0"/>
+              <a:t>Output to dashboard</a:t>
+            </a:r>
+          </a:p>
+          <a:p>
+            <a:pPr algn="l"/>
+            <a:endParaRPr lang="en-US" sz="1200" dirty="0"/>
+          </a:p>
+        </p:txBody>
+      </p:sp>
+    </p:spTree>
+    <p:extLst>
+      <p:ext uri="{BB962C8B-B14F-4D97-AF65-F5344CB8AC3E}">
+        <p14:creationId xmlns:p14="http://schemas.microsoft.com/office/powerpoint/2010/main" val="995937928"/>
+      </p:ext>
+    </p:extLst>
+  </p:cSld>
+  <p:clrMapOvr>
+    <a:masterClrMapping/>
+  </p:clrMapOvr>
+</p:sld>
+</file>
+
 <file path=ppt/slides/slide2.xml><?xml version="1.0" encoding="utf-8"?>
 <p:sld xmlns:a="http://schemas.openxmlformats.org/drawingml/2006/main" xmlns:r="http://schemas.openxmlformats.org/officeDocument/2006/relationships" xmlns:p="http://schemas.openxmlformats.org/presentationml/2006/main">
   <p:cSld>

</xml_diff>

<commit_message>
Live strategy works. Will wait for next interval before running strategy again. Have to take decision do you want the problem to run through from 9.30 start or jump to last.
</commit_message>
<xml_diff>
--- a/Trade Bot.pptx
+++ b/Trade Bot.pptx
@@ -21,6 +21,7 @@
     <p:sldId id="268" r:id="rId15"/>
     <p:sldId id="271" r:id="rId16"/>
     <p:sldId id="272" r:id="rId17"/>
+    <p:sldId id="273" r:id="rId18"/>
   </p:sldIdLst>
   <p:sldSz cx="12192000" cy="6858000"/>
   <p:notesSz cx="6858000" cy="9144000"/>
@@ -276,7 +277,7 @@
           <a:p>
             <a:fld id="{7DF43821-60AB-408D-8E7E-E9FE9B9750F4}" type="datetimeFigureOut">
               <a:rPr lang="en-SG" smtClean="0"/>
-              <a:t>03/02/2022</a:t>
+              <a:t>27/03/2022</a:t>
             </a:fld>
             <a:endParaRPr lang="en-SG"/>
           </a:p>
@@ -476,7 +477,7 @@
           <a:p>
             <a:fld id="{7DF43821-60AB-408D-8E7E-E9FE9B9750F4}" type="datetimeFigureOut">
               <a:rPr lang="en-SG" smtClean="0"/>
-              <a:t>03/02/2022</a:t>
+              <a:t>27/03/2022</a:t>
             </a:fld>
             <a:endParaRPr lang="en-SG"/>
           </a:p>
@@ -686,7 +687,7 @@
           <a:p>
             <a:fld id="{7DF43821-60AB-408D-8E7E-E9FE9B9750F4}" type="datetimeFigureOut">
               <a:rPr lang="en-SG" smtClean="0"/>
-              <a:t>03/02/2022</a:t>
+              <a:t>27/03/2022</a:t>
             </a:fld>
             <a:endParaRPr lang="en-SG"/>
           </a:p>
@@ -886,7 +887,7 @@
           <a:p>
             <a:fld id="{7DF43821-60AB-408D-8E7E-E9FE9B9750F4}" type="datetimeFigureOut">
               <a:rPr lang="en-SG" smtClean="0"/>
-              <a:t>03/02/2022</a:t>
+              <a:t>27/03/2022</a:t>
             </a:fld>
             <a:endParaRPr lang="en-SG"/>
           </a:p>
@@ -1162,7 +1163,7 @@
           <a:p>
             <a:fld id="{7DF43821-60AB-408D-8E7E-E9FE9B9750F4}" type="datetimeFigureOut">
               <a:rPr lang="en-SG" smtClean="0"/>
-              <a:t>03/02/2022</a:t>
+              <a:t>27/03/2022</a:t>
             </a:fld>
             <a:endParaRPr lang="en-SG"/>
           </a:p>
@@ -1430,7 +1431,7 @@
           <a:p>
             <a:fld id="{7DF43821-60AB-408D-8E7E-E9FE9B9750F4}" type="datetimeFigureOut">
               <a:rPr lang="en-SG" smtClean="0"/>
-              <a:t>03/02/2022</a:t>
+              <a:t>27/03/2022</a:t>
             </a:fld>
             <a:endParaRPr lang="en-SG"/>
           </a:p>
@@ -1845,7 +1846,7 @@
           <a:p>
             <a:fld id="{7DF43821-60AB-408D-8E7E-E9FE9B9750F4}" type="datetimeFigureOut">
               <a:rPr lang="en-SG" smtClean="0"/>
-              <a:t>03/02/2022</a:t>
+              <a:t>27/03/2022</a:t>
             </a:fld>
             <a:endParaRPr lang="en-SG"/>
           </a:p>
@@ -1987,7 +1988,7 @@
           <a:p>
             <a:fld id="{7DF43821-60AB-408D-8E7E-E9FE9B9750F4}" type="datetimeFigureOut">
               <a:rPr lang="en-SG" smtClean="0"/>
-              <a:t>03/02/2022</a:t>
+              <a:t>27/03/2022</a:t>
             </a:fld>
             <a:endParaRPr lang="en-SG"/>
           </a:p>
@@ -2100,7 +2101,7 @@
           <a:p>
             <a:fld id="{7DF43821-60AB-408D-8E7E-E9FE9B9750F4}" type="datetimeFigureOut">
               <a:rPr lang="en-SG" smtClean="0"/>
-              <a:t>03/02/2022</a:t>
+              <a:t>27/03/2022</a:t>
             </a:fld>
             <a:endParaRPr lang="en-SG"/>
           </a:p>
@@ -2413,7 +2414,7 @@
           <a:p>
             <a:fld id="{7DF43821-60AB-408D-8E7E-E9FE9B9750F4}" type="datetimeFigureOut">
               <a:rPr lang="en-SG" smtClean="0"/>
-              <a:t>03/02/2022</a:t>
+              <a:t>27/03/2022</a:t>
             </a:fld>
             <a:endParaRPr lang="en-SG"/>
           </a:p>
@@ -2702,7 +2703,7 @@
           <a:p>
             <a:fld id="{7DF43821-60AB-408D-8E7E-E9FE9B9750F4}" type="datetimeFigureOut">
               <a:rPr lang="en-SG" smtClean="0"/>
-              <a:t>03/02/2022</a:t>
+              <a:t>27/03/2022</a:t>
             </a:fld>
             <a:endParaRPr lang="en-SG"/>
           </a:p>
@@ -2945,7 +2946,7 @@
           <a:p>
             <a:fld id="{7DF43821-60AB-408D-8E7E-E9FE9B9750F4}" type="datetimeFigureOut">
               <a:rPr lang="en-SG" smtClean="0"/>
-              <a:t>03/02/2022</a:t>
+              <a:t>27/03/2022</a:t>
             </a:fld>
             <a:endParaRPr lang="en-SG"/>
           </a:p>
@@ -9323,6 +9324,100 @@
 </p:sld>
 </file>
 
+<file path=ppt/slides/slide17.xml><?xml version="1.0" encoding="utf-8"?>
+<p:sld xmlns:a="http://schemas.openxmlformats.org/drawingml/2006/main" xmlns:r="http://schemas.openxmlformats.org/officeDocument/2006/relationships" xmlns:p="http://schemas.openxmlformats.org/presentationml/2006/main">
+  <p:cSld>
+    <p:spTree>
+      <p:nvGrpSpPr>
+        <p:cNvPr id="1" name=""/>
+        <p:cNvGrpSpPr/>
+        <p:nvPr/>
+      </p:nvGrpSpPr>
+      <p:grpSpPr>
+        <a:xfrm>
+          <a:off x="0" y="0"/>
+          <a:ext cx="0" cy="0"/>
+          <a:chOff x="0" y="0"/>
+          <a:chExt cx="0" cy="0"/>
+        </a:xfrm>
+      </p:grpSpPr>
+      <p:sp>
+        <p:nvSpPr>
+          <p:cNvPr id="2" name="Title 1">
+            <a:extLst>
+              <a:ext uri="{FF2B5EF4-FFF2-40B4-BE49-F238E27FC236}">
+                <a16:creationId xmlns:a16="http://schemas.microsoft.com/office/drawing/2014/main" id="{C799DFD5-9CBF-49C3-A637-3376FEBA9836}"/>
+              </a:ext>
+            </a:extLst>
+          </p:cNvPr>
+          <p:cNvSpPr>
+            <a:spLocks noGrp="1"/>
+          </p:cNvSpPr>
+          <p:nvPr>
+            <p:ph type="ctrTitle"/>
+          </p:nvPr>
+        </p:nvSpPr>
+        <p:spPr>
+          <a:xfrm>
+            <a:off x="1524000" y="58547"/>
+            <a:ext cx="9144000" cy="974725"/>
+          </a:xfrm>
+        </p:spPr>
+        <p:txBody>
+          <a:bodyPr/>
+          <a:lstStyle/>
+          <a:p>
+            <a:r>
+              <a:rPr lang="en-US" dirty="0"/>
+              <a:t>Dashboard</a:t>
+            </a:r>
+            <a:endParaRPr lang="en-SG" dirty="0"/>
+          </a:p>
+        </p:txBody>
+      </p:sp>
+      <p:pic>
+        <p:nvPicPr>
+          <p:cNvPr id="3" name="Picture 2">
+            <a:extLst>
+              <a:ext uri="{FF2B5EF4-FFF2-40B4-BE49-F238E27FC236}">
+                <a16:creationId xmlns:a16="http://schemas.microsoft.com/office/drawing/2014/main" id="{5AB5A1C8-C3D1-4BF2-BA29-BEAC8EC59CB8}"/>
+              </a:ext>
+            </a:extLst>
+          </p:cNvPr>
+          <p:cNvPicPr>
+            <a:picLocks noChangeAspect="1"/>
+          </p:cNvPicPr>
+          <p:nvPr/>
+        </p:nvPicPr>
+        <p:blipFill>
+          <a:blip r:embed="rId2"/>
+          <a:stretch>
+            <a:fillRect/>
+          </a:stretch>
+        </p:blipFill>
+        <p:spPr>
+          <a:xfrm>
+            <a:off x="762000" y="893178"/>
+            <a:ext cx="10668000" cy="5751200"/>
+          </a:xfrm>
+          <a:prstGeom prst="rect">
+            <a:avLst/>
+          </a:prstGeom>
+        </p:spPr>
+      </p:pic>
+    </p:spTree>
+    <p:extLst>
+      <p:ext uri="{BB962C8B-B14F-4D97-AF65-F5344CB8AC3E}">
+        <p14:creationId xmlns:p14="http://schemas.microsoft.com/office/powerpoint/2010/main" val="2335635960"/>
+      </p:ext>
+    </p:extLst>
+  </p:cSld>
+  <p:clrMapOvr>
+    <a:masterClrMapping/>
+  </p:clrMapOvr>
+</p:sld>
+</file>
+
 <file path=ppt/slides/slide2.xml><?xml version="1.0" encoding="utf-8"?>
 <p:sld xmlns:a="http://schemas.openxmlformats.org/drawingml/2006/main" xmlns:r="http://schemas.openxmlformats.org/officeDocument/2006/relationships" xmlns:p="http://schemas.openxmlformats.org/presentationml/2006/main">
   <p:cSld>
@@ -9392,7 +9487,7 @@
         </p:nvSpPr>
         <p:spPr>
           <a:xfrm>
-            <a:off x="457201" y="1049338"/>
+            <a:off x="82565" y="985964"/>
             <a:ext cx="5114924" cy="4437062"/>
           </a:xfrm>
         </p:spPr>
@@ -9405,7 +9500,7 @@
             <a:pPr algn="l"/>
             <a:r>
               <a:rPr lang="en-US" sz="1400" b="1" u="sng" dirty="0"/>
-              <a:t>v1.0 Features</a:t>
+              <a:t>v1.0 Features (27/03/2022)</a:t>
             </a:r>
           </a:p>
           <a:p>
@@ -9499,8 +9594,18 @@
             </a:pPr>
             <a:r>
               <a:rPr lang="en-US" sz="1400" dirty="0"/>
-              <a:t>Periodically output the list of tickers that have a feasible setup based on the 3 day trade methods</a:t>
-            </a:r>
+              <a:t>Periodically output the list of tickers that have a feasible setup based on the 3 day trade methods </a:t>
+            </a:r>
+            <a:r>
+              <a:rPr lang="en-US" sz="1400" dirty="0">
+                <a:solidFill>
+                  <a:schemeClr val="accent6"/>
+                </a:solidFill>
+                <a:sym typeface="Wingdings" panose="05000000000000000000" pitchFamily="2" charset="2"/>
+              </a:rPr>
+              <a:t></a:t>
+            </a:r>
+            <a:endParaRPr lang="en-US" sz="1400" dirty="0"/>
           </a:p>
           <a:p>
             <a:pPr algn="l"/>
@@ -9614,7 +9719,7 @@
         </p:nvSpPr>
         <p:spPr>
           <a:xfrm>
-            <a:off x="6467476" y="1049338"/>
+            <a:off x="5100403" y="985964"/>
             <a:ext cx="4733924" cy="5389562"/>
           </a:xfrm>
           <a:prstGeom prst="rect">
@@ -9623,7 +9728,7 @@
         </p:spPr>
         <p:txBody>
           <a:bodyPr vert="horz" lIns="91440" tIns="45720" rIns="91440" bIns="45720" rtlCol="0">
-            <a:normAutofit fontScale="92500" lnSpcReduction="10000"/>
+            <a:normAutofit/>
           </a:bodyPr>
           <a:lstStyle>
             <a:lvl1pPr marL="0" indent="0" algn="ctr" defTabSz="914400" rtl="0" eaLnBrk="1" latinLnBrk="0" hangingPunct="1">
@@ -9802,8 +9907,12 @@
               <a:buAutoNum type="arabicPeriod"/>
             </a:pPr>
             <a:r>
+              <a:rPr lang="en-US" sz="1400" dirty="0" err="1"/>
+              <a:t>Backtest</a:t>
+            </a:r>
+            <a:r>
               <a:rPr lang="en-US" sz="1400" dirty="0"/>
-              <a:t>Dashboard to visualize the possible setups</a:t>
+              <a:t> the various methods</a:t>
             </a:r>
           </a:p>
           <a:p>
@@ -9813,41 +9922,7 @@
             </a:pPr>
             <a:r>
               <a:rPr lang="en-US" sz="1400" dirty="0"/>
-              <a:t>Able to calculate the stop loss</a:t>
-            </a:r>
-          </a:p>
-          <a:p>
-            <a:pPr marL="457200" indent="-457200" algn="l">
-              <a:buFont typeface="+mj-lt"/>
-              <a:buAutoNum type="arabicPeriod"/>
-            </a:pPr>
-            <a:r>
-              <a:rPr lang="en-US" sz="1400" dirty="0" err="1"/>
-              <a:t>Analyse</a:t>
-            </a:r>
-            <a:r>
-              <a:rPr lang="en-US" sz="1400" dirty="0"/>
-              <a:t> if the risk is too big</a:t>
-            </a:r>
-          </a:p>
-          <a:p>
-            <a:pPr marL="457200" indent="-457200" algn="l">
-              <a:buFont typeface="+mj-lt"/>
-              <a:buAutoNum type="arabicPeriod"/>
-            </a:pPr>
-            <a:r>
-              <a:rPr lang="en-US" sz="1400" dirty="0"/>
-              <a:t>Calculate position sizing</a:t>
-            </a:r>
-          </a:p>
-          <a:p>
-            <a:pPr marL="457200" indent="-457200" algn="l">
-              <a:buFont typeface="+mj-lt"/>
-              <a:buAutoNum type="arabicPeriod"/>
-            </a:pPr>
-            <a:r>
-              <a:rPr lang="en-US" sz="1400" dirty="0"/>
-              <a:t>Cross reference with SPY and key levels</a:t>
+              <a:t>Analyze Profits</a:t>
             </a:r>
           </a:p>
           <a:p>
@@ -9859,6 +9934,294 @@
           </a:p>
           <a:p>
             <a:pPr algn="l"/>
+            <a:endParaRPr lang="en-US" sz="1400" dirty="0"/>
+          </a:p>
+          <a:p>
+            <a:pPr algn="l"/>
+            <a:endParaRPr lang="en-US" sz="1400" dirty="0"/>
+          </a:p>
+          <a:p>
+            <a:pPr algn="l"/>
+            <a:endParaRPr lang="en-US" sz="1400" dirty="0"/>
+          </a:p>
+          <a:p>
+            <a:pPr algn="l"/>
+            <a:endParaRPr lang="en-US" dirty="0"/>
+          </a:p>
+          <a:p>
+            <a:pPr marL="457200" indent="-457200" algn="l">
+              <a:buFont typeface="Arial" panose="020B0604020202020204" pitchFamily="34" charset="0"/>
+              <a:buChar char="•"/>
+            </a:pPr>
+            <a:endParaRPr lang="en-US" dirty="0"/>
+          </a:p>
+          <a:p>
+            <a:pPr algn="l"/>
+            <a:endParaRPr lang="en-US" dirty="0"/>
+          </a:p>
+          <a:p>
+            <a:pPr algn="l"/>
+            <a:endParaRPr lang="en-US" dirty="0"/>
+          </a:p>
+        </p:txBody>
+      </p:sp>
+      <p:sp>
+        <p:nvSpPr>
+          <p:cNvPr id="5" name="Subtitle 2">
+            <a:extLst>
+              <a:ext uri="{FF2B5EF4-FFF2-40B4-BE49-F238E27FC236}">
+                <a16:creationId xmlns:a16="http://schemas.microsoft.com/office/drawing/2014/main" id="{42B687F5-067E-43CD-8D2B-6EDAB1851515}"/>
+              </a:ext>
+            </a:extLst>
+          </p:cNvPr>
+          <p:cNvSpPr txBox="1">
+            <a:spLocks/>
+          </p:cNvSpPr>
+          <p:nvPr/>
+        </p:nvSpPr>
+        <p:spPr>
+          <a:xfrm>
+            <a:off x="8979051" y="1064482"/>
+            <a:ext cx="3212949" cy="5389562"/>
+          </a:xfrm>
+          <a:prstGeom prst="rect">
+            <a:avLst/>
+          </a:prstGeom>
+        </p:spPr>
+        <p:txBody>
+          <a:bodyPr vert="horz" lIns="91440" tIns="45720" rIns="91440" bIns="45720" rtlCol="0">
+            <a:normAutofit fontScale="85000" lnSpcReduction="10000"/>
+          </a:bodyPr>
+          <a:lstStyle>
+            <a:lvl1pPr marL="0" indent="0" algn="ctr" defTabSz="914400" rtl="0" eaLnBrk="1" latinLnBrk="0" hangingPunct="1">
+              <a:lnSpc>
+                <a:spcPct val="90000"/>
+              </a:lnSpc>
+              <a:spcBef>
+                <a:spcPts val="1000"/>
+              </a:spcBef>
+              <a:buFont typeface="Arial" panose="020B0604020202020204" pitchFamily="34" charset="0"/>
+              <a:buNone/>
+              <a:defRPr sz="2400" kern="1200">
+                <a:solidFill>
+                  <a:schemeClr val="tx1"/>
+                </a:solidFill>
+                <a:latin typeface="+mn-lt"/>
+                <a:ea typeface="+mn-ea"/>
+                <a:cs typeface="+mn-cs"/>
+              </a:defRPr>
+            </a:lvl1pPr>
+            <a:lvl2pPr marL="457200" indent="0" algn="ctr" defTabSz="914400" rtl="0" eaLnBrk="1" latinLnBrk="0" hangingPunct="1">
+              <a:lnSpc>
+                <a:spcPct val="90000"/>
+              </a:lnSpc>
+              <a:spcBef>
+                <a:spcPts val="500"/>
+              </a:spcBef>
+              <a:buFont typeface="Arial" panose="020B0604020202020204" pitchFamily="34" charset="0"/>
+              <a:buNone/>
+              <a:defRPr sz="2000" kern="1200">
+                <a:solidFill>
+                  <a:schemeClr val="tx1"/>
+                </a:solidFill>
+                <a:latin typeface="+mn-lt"/>
+                <a:ea typeface="+mn-ea"/>
+                <a:cs typeface="+mn-cs"/>
+              </a:defRPr>
+            </a:lvl2pPr>
+            <a:lvl3pPr marL="914400" indent="0" algn="ctr" defTabSz="914400" rtl="0" eaLnBrk="1" latinLnBrk="0" hangingPunct="1">
+              <a:lnSpc>
+                <a:spcPct val="90000"/>
+              </a:lnSpc>
+              <a:spcBef>
+                <a:spcPts val="500"/>
+              </a:spcBef>
+              <a:buFont typeface="Arial" panose="020B0604020202020204" pitchFamily="34" charset="0"/>
+              <a:buNone/>
+              <a:defRPr sz="1800" kern="1200">
+                <a:solidFill>
+                  <a:schemeClr val="tx1"/>
+                </a:solidFill>
+                <a:latin typeface="+mn-lt"/>
+                <a:ea typeface="+mn-ea"/>
+                <a:cs typeface="+mn-cs"/>
+              </a:defRPr>
+            </a:lvl3pPr>
+            <a:lvl4pPr marL="1371600" indent="0" algn="ctr" defTabSz="914400" rtl="0" eaLnBrk="1" latinLnBrk="0" hangingPunct="1">
+              <a:lnSpc>
+                <a:spcPct val="90000"/>
+              </a:lnSpc>
+              <a:spcBef>
+                <a:spcPts val="500"/>
+              </a:spcBef>
+              <a:buFont typeface="Arial" panose="020B0604020202020204" pitchFamily="34" charset="0"/>
+              <a:buNone/>
+              <a:defRPr sz="1600" kern="1200">
+                <a:solidFill>
+                  <a:schemeClr val="tx1"/>
+                </a:solidFill>
+                <a:latin typeface="+mn-lt"/>
+                <a:ea typeface="+mn-ea"/>
+                <a:cs typeface="+mn-cs"/>
+              </a:defRPr>
+            </a:lvl4pPr>
+            <a:lvl5pPr marL="1828800" indent="0" algn="ctr" defTabSz="914400" rtl="0" eaLnBrk="1" latinLnBrk="0" hangingPunct="1">
+              <a:lnSpc>
+                <a:spcPct val="90000"/>
+              </a:lnSpc>
+              <a:spcBef>
+                <a:spcPts val="500"/>
+              </a:spcBef>
+              <a:buFont typeface="Arial" panose="020B0604020202020204" pitchFamily="34" charset="0"/>
+              <a:buNone/>
+              <a:defRPr sz="1600" kern="1200">
+                <a:solidFill>
+                  <a:schemeClr val="tx1"/>
+                </a:solidFill>
+                <a:latin typeface="+mn-lt"/>
+                <a:ea typeface="+mn-ea"/>
+                <a:cs typeface="+mn-cs"/>
+              </a:defRPr>
+            </a:lvl5pPr>
+            <a:lvl6pPr marL="2286000" indent="0" algn="ctr" defTabSz="914400" rtl="0" eaLnBrk="1" latinLnBrk="0" hangingPunct="1">
+              <a:lnSpc>
+                <a:spcPct val="90000"/>
+              </a:lnSpc>
+              <a:spcBef>
+                <a:spcPts val="500"/>
+              </a:spcBef>
+              <a:buFont typeface="Arial" panose="020B0604020202020204" pitchFamily="34" charset="0"/>
+              <a:buNone/>
+              <a:defRPr sz="1600" kern="1200">
+                <a:solidFill>
+                  <a:schemeClr val="tx1"/>
+                </a:solidFill>
+                <a:latin typeface="+mn-lt"/>
+                <a:ea typeface="+mn-ea"/>
+                <a:cs typeface="+mn-cs"/>
+              </a:defRPr>
+            </a:lvl6pPr>
+            <a:lvl7pPr marL="2743200" indent="0" algn="ctr" defTabSz="914400" rtl="0" eaLnBrk="1" latinLnBrk="0" hangingPunct="1">
+              <a:lnSpc>
+                <a:spcPct val="90000"/>
+              </a:lnSpc>
+              <a:spcBef>
+                <a:spcPts val="500"/>
+              </a:spcBef>
+              <a:buFont typeface="Arial" panose="020B0604020202020204" pitchFamily="34" charset="0"/>
+              <a:buNone/>
+              <a:defRPr sz="1600" kern="1200">
+                <a:solidFill>
+                  <a:schemeClr val="tx1"/>
+                </a:solidFill>
+                <a:latin typeface="+mn-lt"/>
+                <a:ea typeface="+mn-ea"/>
+                <a:cs typeface="+mn-cs"/>
+              </a:defRPr>
+            </a:lvl7pPr>
+            <a:lvl8pPr marL="3200400" indent="0" algn="ctr" defTabSz="914400" rtl="0" eaLnBrk="1" latinLnBrk="0" hangingPunct="1">
+              <a:lnSpc>
+                <a:spcPct val="90000"/>
+              </a:lnSpc>
+              <a:spcBef>
+                <a:spcPts val="500"/>
+              </a:spcBef>
+              <a:buFont typeface="Arial" panose="020B0604020202020204" pitchFamily="34" charset="0"/>
+              <a:buNone/>
+              <a:defRPr sz="1600" kern="1200">
+                <a:solidFill>
+                  <a:schemeClr val="tx1"/>
+                </a:solidFill>
+                <a:latin typeface="+mn-lt"/>
+                <a:ea typeface="+mn-ea"/>
+                <a:cs typeface="+mn-cs"/>
+              </a:defRPr>
+            </a:lvl8pPr>
+            <a:lvl9pPr marL="3657600" indent="0" algn="ctr" defTabSz="914400" rtl="0" eaLnBrk="1" latinLnBrk="0" hangingPunct="1">
+              <a:lnSpc>
+                <a:spcPct val="90000"/>
+              </a:lnSpc>
+              <a:spcBef>
+                <a:spcPts val="500"/>
+              </a:spcBef>
+              <a:buFont typeface="Arial" panose="020B0604020202020204" pitchFamily="34" charset="0"/>
+              <a:buNone/>
+              <a:defRPr sz="1600" kern="1200">
+                <a:solidFill>
+                  <a:schemeClr val="tx1"/>
+                </a:solidFill>
+                <a:latin typeface="+mn-lt"/>
+                <a:ea typeface="+mn-ea"/>
+                <a:cs typeface="+mn-cs"/>
+              </a:defRPr>
+            </a:lvl9pPr>
+          </a:lstStyle>
+          <a:p>
+            <a:pPr algn="l"/>
+            <a:r>
+              <a:rPr lang="en-US" sz="1400" b="1" u="sng" dirty="0"/>
+              <a:t>v1.02 Features</a:t>
+            </a:r>
+          </a:p>
+          <a:p>
+            <a:pPr marL="457200" indent="-457200" algn="l">
+              <a:buFont typeface="+mj-lt"/>
+              <a:buAutoNum type="arabicPeriod"/>
+            </a:pPr>
+            <a:r>
+              <a:rPr lang="en-US" sz="1400" dirty="0"/>
+              <a:t>Dashboard to visualize the possible setups</a:t>
+            </a:r>
+          </a:p>
+          <a:p>
+            <a:pPr marL="457200" indent="-457200" algn="l">
+              <a:buFont typeface="+mj-lt"/>
+              <a:buAutoNum type="arabicPeriod"/>
+            </a:pPr>
+            <a:r>
+              <a:rPr lang="en-US" sz="1400" dirty="0"/>
+              <a:t>Able to calculate the stop loss</a:t>
+            </a:r>
+          </a:p>
+          <a:p>
+            <a:pPr marL="457200" indent="-457200" algn="l">
+              <a:buFont typeface="+mj-lt"/>
+              <a:buAutoNum type="arabicPeriod"/>
+            </a:pPr>
+            <a:r>
+              <a:rPr lang="en-US" sz="1400" dirty="0" err="1"/>
+              <a:t>Analyse</a:t>
+            </a:r>
+            <a:r>
+              <a:rPr lang="en-US" sz="1400" dirty="0"/>
+              <a:t> if the risk is too big</a:t>
+            </a:r>
+          </a:p>
+          <a:p>
+            <a:pPr marL="457200" indent="-457200" algn="l">
+              <a:buFont typeface="+mj-lt"/>
+              <a:buAutoNum type="arabicPeriod"/>
+            </a:pPr>
+            <a:r>
+              <a:rPr lang="en-US" sz="1400" dirty="0"/>
+              <a:t>Calculate position sizing</a:t>
+            </a:r>
+          </a:p>
+          <a:p>
+            <a:pPr marL="457200" indent="-457200" algn="l">
+              <a:buFont typeface="+mj-lt"/>
+              <a:buAutoNum type="arabicPeriod"/>
+            </a:pPr>
+            <a:r>
+              <a:rPr lang="en-US" sz="1400" dirty="0"/>
+              <a:t>Cross reference with SPY and key levels</a:t>
+            </a:r>
+          </a:p>
+          <a:p>
+            <a:pPr marL="457200" indent="-457200" algn="l">
+              <a:buFont typeface="+mj-lt"/>
+              <a:buAutoNum type="arabicPeriod"/>
+            </a:pPr>
             <a:endParaRPr lang="en-US" sz="1400" dirty="0"/>
           </a:p>
           <a:p>

</xml_diff>